<commit_message>
Updated "16S_ASV_Analysis.R" to include venn diagram code and updated piechart code. Updated associated "16S piechart family.png" figure. Updated Fig 3B to include piecharts, saved updated figures in "Figures - Sparagon and Arts et al.  2022_11_07.pptx" Updated formatting of synthesis figure "Synthesis Figure.png" and "Synthesis Figure.pptx"
</commit_message>
<xml_diff>
--- a/figures/Synthesis Figure.pptx
+++ b/figures/Synthesis Figure.pptx
@@ -271,7 +271,7 @@
           <a:p>
             <a:fld id="{FE17BAA6-2BAA-4FAA-BBCC-9D33CF1DE795}" type="datetimeFigureOut">
               <a:rPr lang="en-US" smtClean="0"/>
-              <a:t>11/12/2022</a:t>
+              <a:t>11/14/2022</a:t>
             </a:fld>
             <a:endParaRPr lang="en-US"/>
           </a:p>
@@ -441,7 +441,7 @@
           <a:p>
             <a:fld id="{FE17BAA6-2BAA-4FAA-BBCC-9D33CF1DE795}" type="datetimeFigureOut">
               <a:rPr lang="en-US" smtClean="0"/>
-              <a:t>11/12/2022</a:t>
+              <a:t>11/14/2022</a:t>
             </a:fld>
             <a:endParaRPr lang="en-US"/>
           </a:p>
@@ -621,7 +621,7 @@
           <a:p>
             <a:fld id="{FE17BAA6-2BAA-4FAA-BBCC-9D33CF1DE795}" type="datetimeFigureOut">
               <a:rPr lang="en-US" smtClean="0"/>
-              <a:t>11/12/2022</a:t>
+              <a:t>11/14/2022</a:t>
             </a:fld>
             <a:endParaRPr lang="en-US"/>
           </a:p>
@@ -791,7 +791,7 @@
           <a:p>
             <a:fld id="{FE17BAA6-2BAA-4FAA-BBCC-9D33CF1DE795}" type="datetimeFigureOut">
               <a:rPr lang="en-US" smtClean="0"/>
-              <a:t>11/12/2022</a:t>
+              <a:t>11/14/2022</a:t>
             </a:fld>
             <a:endParaRPr lang="en-US"/>
           </a:p>
@@ -1035,7 +1035,7 @@
           <a:p>
             <a:fld id="{FE17BAA6-2BAA-4FAA-BBCC-9D33CF1DE795}" type="datetimeFigureOut">
               <a:rPr lang="en-US" smtClean="0"/>
-              <a:t>11/12/2022</a:t>
+              <a:t>11/14/2022</a:t>
             </a:fld>
             <a:endParaRPr lang="en-US"/>
           </a:p>
@@ -1267,7 +1267,7 @@
           <a:p>
             <a:fld id="{FE17BAA6-2BAA-4FAA-BBCC-9D33CF1DE795}" type="datetimeFigureOut">
               <a:rPr lang="en-US" smtClean="0"/>
-              <a:t>11/12/2022</a:t>
+              <a:t>11/14/2022</a:t>
             </a:fld>
             <a:endParaRPr lang="en-US"/>
           </a:p>
@@ -1634,7 +1634,7 @@
           <a:p>
             <a:fld id="{FE17BAA6-2BAA-4FAA-BBCC-9D33CF1DE795}" type="datetimeFigureOut">
               <a:rPr lang="en-US" smtClean="0"/>
-              <a:t>11/12/2022</a:t>
+              <a:t>11/14/2022</a:t>
             </a:fld>
             <a:endParaRPr lang="en-US"/>
           </a:p>
@@ -1752,7 +1752,7 @@
           <a:p>
             <a:fld id="{FE17BAA6-2BAA-4FAA-BBCC-9D33CF1DE795}" type="datetimeFigureOut">
               <a:rPr lang="en-US" smtClean="0"/>
-              <a:t>11/12/2022</a:t>
+              <a:t>11/14/2022</a:t>
             </a:fld>
             <a:endParaRPr lang="en-US"/>
           </a:p>
@@ -1847,7 +1847,7 @@
           <a:p>
             <a:fld id="{FE17BAA6-2BAA-4FAA-BBCC-9D33CF1DE795}" type="datetimeFigureOut">
               <a:rPr lang="en-US" smtClean="0"/>
-              <a:t>11/12/2022</a:t>
+              <a:t>11/14/2022</a:t>
             </a:fld>
             <a:endParaRPr lang="en-US"/>
           </a:p>
@@ -2124,7 +2124,7 @@
           <a:p>
             <a:fld id="{FE17BAA6-2BAA-4FAA-BBCC-9D33CF1DE795}" type="datetimeFigureOut">
               <a:rPr lang="en-US" smtClean="0"/>
-              <a:t>11/12/2022</a:t>
+              <a:t>11/14/2022</a:t>
             </a:fld>
             <a:endParaRPr lang="en-US"/>
           </a:p>
@@ -2381,7 +2381,7 @@
           <a:p>
             <a:fld id="{FE17BAA6-2BAA-4FAA-BBCC-9D33CF1DE795}" type="datetimeFigureOut">
               <a:rPr lang="en-US" smtClean="0"/>
-              <a:t>11/12/2022</a:t>
+              <a:t>11/14/2022</a:t>
             </a:fld>
             <a:endParaRPr lang="en-US"/>
           </a:p>
@@ -2594,7 +2594,7 @@
           <a:p>
             <a:fld id="{FE17BAA6-2BAA-4FAA-BBCC-9D33CF1DE795}" type="datetimeFigureOut">
               <a:rPr lang="en-US" smtClean="0"/>
-              <a:t>11/12/2022</a:t>
+              <a:t>11/14/2022</a:t>
             </a:fld>
             <a:endParaRPr lang="en-US"/>
           </a:p>
@@ -3140,7 +3140,7 @@
           </a:solidFill>
           <a:ln>
             <a:solidFill>
-              <a:schemeClr val="accent1"/>
+              <a:srgbClr val="0070C0"/>
             </a:solidFill>
           </a:ln>
         </p:spPr>
@@ -3152,11 +3152,7 @@
           <a:p>
             <a:pPr algn="ctr"/>
             <a:r>
-              <a:rPr lang="en-US" sz="2800" b="1" dirty="0">
-                <a:solidFill>
-                  <a:srgbClr val="0070C0"/>
-                </a:solidFill>
-              </a:rPr>
+              <a:rPr lang="en-US" sz="2800" b="1" dirty="0"/>
               <a:t>Non-bleached + Ambient</a:t>
             </a:r>
           </a:p>
@@ -3176,7 +3172,7 @@
         </p:nvSpPr>
         <p:spPr>
           <a:xfrm>
-            <a:off x="1616440" y="9280584"/>
+            <a:off x="1817701" y="9312053"/>
             <a:ext cx="2378249" cy="646331"/>
           </a:xfrm>
           <a:prstGeom prst="rect">
@@ -3220,7 +3216,7 @@
         </p:nvSpPr>
         <p:spPr>
           <a:xfrm>
-            <a:off x="7312524" y="9078628"/>
+            <a:off x="7489357" y="9000359"/>
             <a:ext cx="3994017" cy="1200329"/>
           </a:xfrm>
           <a:prstGeom prst="rect">
@@ -3267,7 +3263,7 @@
           </a:solidFill>
           <a:ln>
             <a:solidFill>
-              <a:srgbClr val="CD2626"/>
+              <a:srgbClr val="C00000"/>
             </a:solidFill>
           </a:ln>
         </p:spPr>
@@ -3279,11 +3275,7 @@
           <a:p>
             <a:pPr algn="ctr"/>
             <a:r>
-              <a:rPr lang="en-US" sz="2800" b="1" dirty="0">
-                <a:solidFill>
-                  <a:srgbClr val="CD2626"/>
-                </a:solidFill>
-              </a:rPr>
+              <a:rPr lang="en-US" sz="2800" b="1" dirty="0"/>
               <a:t>Non-bleached + Heated</a:t>
             </a:r>
           </a:p>
@@ -3467,7 +3459,7 @@
         </p:nvCxnSpPr>
         <p:spPr>
           <a:xfrm>
-            <a:off x="665499" y="14369470"/>
+            <a:off x="665499" y="13632870"/>
             <a:ext cx="0" cy="3287949"/>
           </a:xfrm>
           <a:prstGeom prst="line">
@@ -3506,7 +3498,7 @@
         </p:nvCxnSpPr>
         <p:spPr>
           <a:xfrm flipH="1" flipV="1">
-            <a:off x="636914" y="17657419"/>
+            <a:off x="636914" y="16920819"/>
             <a:ext cx="24351535" cy="107361"/>
           </a:xfrm>
           <a:prstGeom prst="line">
@@ -3543,7 +3535,7 @@
         </p:nvSpPr>
         <p:spPr>
           <a:xfrm rot="16200000">
-            <a:off x="-935788" y="15826494"/>
+            <a:off x="-935788" y="15089894"/>
             <a:ext cx="2394796" cy="523220"/>
           </a:xfrm>
           <a:prstGeom prst="rect">
@@ -3588,7 +3580,7 @@
         </p:nvSpPr>
         <p:spPr>
           <a:xfrm>
-            <a:off x="11331521" y="17764780"/>
+            <a:off x="11331521" y="17028180"/>
             <a:ext cx="2394796" cy="523220"/>
           </a:xfrm>
           <a:prstGeom prst="rect">
@@ -5566,8 +5558,8 @@
         </p:blipFill>
         <p:spPr>
           <a:xfrm>
-            <a:off x="599363" y="572105"/>
-            <a:ext cx="3372843" cy="2963584"/>
+            <a:off x="863911" y="841699"/>
+            <a:ext cx="3013981" cy="2648266"/>
           </a:xfrm>
           <a:prstGeom prst="rect">
             <a:avLst/>
@@ -5676,7 +5668,7 @@
         </p:nvCxnSpPr>
         <p:spPr>
           <a:xfrm>
-            <a:off x="739935" y="17273470"/>
+            <a:off x="739935" y="16536870"/>
             <a:ext cx="4889402" cy="0"/>
           </a:xfrm>
           <a:prstGeom prst="line">
@@ -5719,7 +5711,7 @@
         </p:nvCxnSpPr>
         <p:spPr>
           <a:xfrm flipV="1">
-            <a:off x="5577166" y="14583515"/>
+            <a:off x="5577166" y="13846915"/>
             <a:ext cx="7762484" cy="2701987"/>
           </a:xfrm>
           <a:prstGeom prst="line">
@@ -5762,7 +5754,7 @@
         </p:nvCxnSpPr>
         <p:spPr>
           <a:xfrm flipV="1">
-            <a:off x="13291453" y="14586924"/>
+            <a:off x="13291453" y="13850324"/>
             <a:ext cx="3311733" cy="3120"/>
           </a:xfrm>
           <a:prstGeom prst="line">
@@ -5805,7 +5797,7 @@
         </p:nvCxnSpPr>
         <p:spPr>
           <a:xfrm>
-            <a:off x="16591154" y="14565980"/>
+            <a:off x="16591154" y="13829380"/>
             <a:ext cx="3534358" cy="2719522"/>
           </a:xfrm>
           <a:prstGeom prst="line">
@@ -5848,7 +5840,7 @@
         </p:nvCxnSpPr>
         <p:spPr>
           <a:xfrm>
-            <a:off x="20099047" y="17285502"/>
+            <a:off x="20099047" y="16548902"/>
             <a:ext cx="4889402" cy="0"/>
           </a:xfrm>
           <a:prstGeom prst="line">

</xml_diff>

<commit_message>
Updated 16S_tend_alpha_diversity.jpg with correct color scheme. Updated Figures - Sparagon and Arts et al.  2022_11_07.pptx. Created new figures pptx and pdfs called "Figures - Sparagon and Arts et al.  16.11.2022" Updated Symbiont cells per cm2_per treatment v2.jpeg with correct colors. Updated pptx and png of "Synthesis Figure".
</commit_message>
<xml_diff>
--- a/figures/Synthesis Figure.pptx
+++ b/figures/Synthesis Figure.pptx
@@ -271,7 +271,7 @@
           <a:p>
             <a:fld id="{FE17BAA6-2BAA-4FAA-BBCC-9D33CF1DE795}" type="datetimeFigureOut">
               <a:rPr lang="en-US" smtClean="0"/>
-              <a:t>11/14/2022</a:t>
+              <a:t>11/16/2022</a:t>
             </a:fld>
             <a:endParaRPr lang="en-US"/>
           </a:p>
@@ -441,7 +441,7 @@
           <a:p>
             <a:fld id="{FE17BAA6-2BAA-4FAA-BBCC-9D33CF1DE795}" type="datetimeFigureOut">
               <a:rPr lang="en-US" smtClean="0"/>
-              <a:t>11/14/2022</a:t>
+              <a:t>11/16/2022</a:t>
             </a:fld>
             <a:endParaRPr lang="en-US"/>
           </a:p>
@@ -621,7 +621,7 @@
           <a:p>
             <a:fld id="{FE17BAA6-2BAA-4FAA-BBCC-9D33CF1DE795}" type="datetimeFigureOut">
               <a:rPr lang="en-US" smtClean="0"/>
-              <a:t>11/14/2022</a:t>
+              <a:t>11/16/2022</a:t>
             </a:fld>
             <a:endParaRPr lang="en-US"/>
           </a:p>
@@ -791,7 +791,7 @@
           <a:p>
             <a:fld id="{FE17BAA6-2BAA-4FAA-BBCC-9D33CF1DE795}" type="datetimeFigureOut">
               <a:rPr lang="en-US" smtClean="0"/>
-              <a:t>11/14/2022</a:t>
+              <a:t>11/16/2022</a:t>
             </a:fld>
             <a:endParaRPr lang="en-US"/>
           </a:p>
@@ -1035,7 +1035,7 @@
           <a:p>
             <a:fld id="{FE17BAA6-2BAA-4FAA-BBCC-9D33CF1DE795}" type="datetimeFigureOut">
               <a:rPr lang="en-US" smtClean="0"/>
-              <a:t>11/14/2022</a:t>
+              <a:t>11/16/2022</a:t>
             </a:fld>
             <a:endParaRPr lang="en-US"/>
           </a:p>
@@ -1267,7 +1267,7 @@
           <a:p>
             <a:fld id="{FE17BAA6-2BAA-4FAA-BBCC-9D33CF1DE795}" type="datetimeFigureOut">
               <a:rPr lang="en-US" smtClean="0"/>
-              <a:t>11/14/2022</a:t>
+              <a:t>11/16/2022</a:t>
             </a:fld>
             <a:endParaRPr lang="en-US"/>
           </a:p>
@@ -1634,7 +1634,7 @@
           <a:p>
             <a:fld id="{FE17BAA6-2BAA-4FAA-BBCC-9D33CF1DE795}" type="datetimeFigureOut">
               <a:rPr lang="en-US" smtClean="0"/>
-              <a:t>11/14/2022</a:t>
+              <a:t>11/16/2022</a:t>
             </a:fld>
             <a:endParaRPr lang="en-US"/>
           </a:p>
@@ -1752,7 +1752,7 @@
           <a:p>
             <a:fld id="{FE17BAA6-2BAA-4FAA-BBCC-9D33CF1DE795}" type="datetimeFigureOut">
               <a:rPr lang="en-US" smtClean="0"/>
-              <a:t>11/14/2022</a:t>
+              <a:t>11/16/2022</a:t>
             </a:fld>
             <a:endParaRPr lang="en-US"/>
           </a:p>
@@ -1847,7 +1847,7 @@
           <a:p>
             <a:fld id="{FE17BAA6-2BAA-4FAA-BBCC-9D33CF1DE795}" type="datetimeFigureOut">
               <a:rPr lang="en-US" smtClean="0"/>
-              <a:t>11/14/2022</a:t>
+              <a:t>11/16/2022</a:t>
             </a:fld>
             <a:endParaRPr lang="en-US"/>
           </a:p>
@@ -2124,7 +2124,7 @@
           <a:p>
             <a:fld id="{FE17BAA6-2BAA-4FAA-BBCC-9D33CF1DE795}" type="datetimeFigureOut">
               <a:rPr lang="en-US" smtClean="0"/>
-              <a:t>11/14/2022</a:t>
+              <a:t>11/16/2022</a:t>
             </a:fld>
             <a:endParaRPr lang="en-US"/>
           </a:p>
@@ -2381,7 +2381,7 @@
           <a:p>
             <a:fld id="{FE17BAA6-2BAA-4FAA-BBCC-9D33CF1DE795}" type="datetimeFigureOut">
               <a:rPr lang="en-US" smtClean="0"/>
-              <a:t>11/14/2022</a:t>
+              <a:t>11/16/2022</a:t>
             </a:fld>
             <a:endParaRPr lang="en-US"/>
           </a:p>
@@ -2594,7 +2594,7 @@
           <a:p>
             <a:fld id="{FE17BAA6-2BAA-4FAA-BBCC-9D33CF1DE795}" type="datetimeFigureOut">
               <a:rPr lang="en-US" smtClean="0"/>
-              <a:t>11/14/2022</a:t>
+              <a:t>11/16/2022</a:t>
             </a:fld>
             <a:endParaRPr lang="en-US"/>
           </a:p>
@@ -5558,8 +5558,8 @@
         </p:blipFill>
         <p:spPr>
           <a:xfrm>
-            <a:off x="863911" y="841699"/>
-            <a:ext cx="3013981" cy="2648266"/>
+            <a:off x="496109" y="519323"/>
+            <a:ext cx="3387549" cy="2976505"/>
           </a:xfrm>
           <a:prstGeom prst="rect">
             <a:avLst/>

</xml_diff>

<commit_message>
Updated code for figures and added new figures.
</commit_message>
<xml_diff>
--- a/figures/Synthesis Figure.pptx
+++ b/figures/Synthesis Figure.pptx
@@ -271,7 +271,7 @@
           <a:p>
             <a:fld id="{FE17BAA6-2BAA-4FAA-BBCC-9D33CF1DE795}" type="datetimeFigureOut">
               <a:rPr lang="en-US" smtClean="0"/>
-              <a:t>2/13/2023</a:t>
+              <a:t>2/14/2023</a:t>
             </a:fld>
             <a:endParaRPr lang="en-US"/>
           </a:p>
@@ -441,7 +441,7 @@
           <a:p>
             <a:fld id="{FE17BAA6-2BAA-4FAA-BBCC-9D33CF1DE795}" type="datetimeFigureOut">
               <a:rPr lang="en-US" smtClean="0"/>
-              <a:t>2/13/2023</a:t>
+              <a:t>2/14/2023</a:t>
             </a:fld>
             <a:endParaRPr lang="en-US"/>
           </a:p>
@@ -621,7 +621,7 @@
           <a:p>
             <a:fld id="{FE17BAA6-2BAA-4FAA-BBCC-9D33CF1DE795}" type="datetimeFigureOut">
               <a:rPr lang="en-US" smtClean="0"/>
-              <a:t>2/13/2023</a:t>
+              <a:t>2/14/2023</a:t>
             </a:fld>
             <a:endParaRPr lang="en-US"/>
           </a:p>
@@ -791,7 +791,7 @@
           <a:p>
             <a:fld id="{FE17BAA6-2BAA-4FAA-BBCC-9D33CF1DE795}" type="datetimeFigureOut">
               <a:rPr lang="en-US" smtClean="0"/>
-              <a:t>2/13/2023</a:t>
+              <a:t>2/14/2023</a:t>
             </a:fld>
             <a:endParaRPr lang="en-US"/>
           </a:p>
@@ -1035,7 +1035,7 @@
           <a:p>
             <a:fld id="{FE17BAA6-2BAA-4FAA-BBCC-9D33CF1DE795}" type="datetimeFigureOut">
               <a:rPr lang="en-US" smtClean="0"/>
-              <a:t>2/13/2023</a:t>
+              <a:t>2/14/2023</a:t>
             </a:fld>
             <a:endParaRPr lang="en-US"/>
           </a:p>
@@ -1267,7 +1267,7 @@
           <a:p>
             <a:fld id="{FE17BAA6-2BAA-4FAA-BBCC-9D33CF1DE795}" type="datetimeFigureOut">
               <a:rPr lang="en-US" smtClean="0"/>
-              <a:t>2/13/2023</a:t>
+              <a:t>2/14/2023</a:t>
             </a:fld>
             <a:endParaRPr lang="en-US"/>
           </a:p>
@@ -1634,7 +1634,7 @@
           <a:p>
             <a:fld id="{FE17BAA6-2BAA-4FAA-BBCC-9D33CF1DE795}" type="datetimeFigureOut">
               <a:rPr lang="en-US" smtClean="0"/>
-              <a:t>2/13/2023</a:t>
+              <a:t>2/14/2023</a:t>
             </a:fld>
             <a:endParaRPr lang="en-US"/>
           </a:p>
@@ -1752,7 +1752,7 @@
           <a:p>
             <a:fld id="{FE17BAA6-2BAA-4FAA-BBCC-9D33CF1DE795}" type="datetimeFigureOut">
               <a:rPr lang="en-US" smtClean="0"/>
-              <a:t>2/13/2023</a:t>
+              <a:t>2/14/2023</a:t>
             </a:fld>
             <a:endParaRPr lang="en-US"/>
           </a:p>
@@ -1847,7 +1847,7 @@
           <a:p>
             <a:fld id="{FE17BAA6-2BAA-4FAA-BBCC-9D33CF1DE795}" type="datetimeFigureOut">
               <a:rPr lang="en-US" smtClean="0"/>
-              <a:t>2/13/2023</a:t>
+              <a:t>2/14/2023</a:t>
             </a:fld>
             <a:endParaRPr lang="en-US"/>
           </a:p>
@@ -2124,7 +2124,7 @@
           <a:p>
             <a:fld id="{FE17BAA6-2BAA-4FAA-BBCC-9D33CF1DE795}" type="datetimeFigureOut">
               <a:rPr lang="en-US" smtClean="0"/>
-              <a:t>2/13/2023</a:t>
+              <a:t>2/14/2023</a:t>
             </a:fld>
             <a:endParaRPr lang="en-US"/>
           </a:p>
@@ -2381,7 +2381,7 @@
           <a:p>
             <a:fld id="{FE17BAA6-2BAA-4FAA-BBCC-9D33CF1DE795}" type="datetimeFigureOut">
               <a:rPr lang="en-US" smtClean="0"/>
-              <a:t>2/13/2023</a:t>
+              <a:t>2/14/2023</a:t>
             </a:fld>
             <a:endParaRPr lang="en-US"/>
           </a:p>
@@ -2594,7 +2594,7 @@
           <a:p>
             <a:fld id="{FE17BAA6-2BAA-4FAA-BBCC-9D33CF1DE795}" type="datetimeFigureOut">
               <a:rPr lang="en-US" smtClean="0"/>
-              <a:t>2/13/2023</a:t>
+              <a:t>2/14/2023</a:t>
             </a:fld>
             <a:endParaRPr lang="en-US"/>
           </a:p>
@@ -3443,166 +3443,6 @@
           </a:p>
         </p:txBody>
       </p:sp>
-      <p:cxnSp>
-        <p:nvCxnSpPr>
-          <p:cNvPr id="22" name="Straight Connector 21">
-            <a:extLst>
-              <a:ext uri="{FF2B5EF4-FFF2-40B4-BE49-F238E27FC236}">
-                <a16:creationId xmlns:a16="http://schemas.microsoft.com/office/drawing/2014/main" id="{BAE23B92-A9EC-B7F3-F3C2-DDC5D66953B9}"/>
-              </a:ext>
-            </a:extLst>
-          </p:cNvPr>
-          <p:cNvCxnSpPr>
-            <a:cxnSpLocks/>
-          </p:cNvCxnSpPr>
-          <p:nvPr/>
-        </p:nvCxnSpPr>
-        <p:spPr>
-          <a:xfrm>
-            <a:off x="665499" y="13632870"/>
-            <a:ext cx="0" cy="3287949"/>
-          </a:xfrm>
-          <a:prstGeom prst="line">
-            <a:avLst/>
-          </a:prstGeom>
-          <a:ln w="38100"/>
-        </p:spPr>
-        <p:style>
-          <a:lnRef idx="1">
-            <a:schemeClr val="dk1"/>
-          </a:lnRef>
-          <a:fillRef idx="0">
-            <a:schemeClr val="dk1"/>
-          </a:fillRef>
-          <a:effectRef idx="0">
-            <a:schemeClr val="dk1"/>
-          </a:effectRef>
-          <a:fontRef idx="minor">
-            <a:schemeClr val="tx1"/>
-          </a:fontRef>
-        </p:style>
-      </p:cxnSp>
-      <p:cxnSp>
-        <p:nvCxnSpPr>
-          <p:cNvPr id="23" name="Straight Connector 22">
-            <a:extLst>
-              <a:ext uri="{FF2B5EF4-FFF2-40B4-BE49-F238E27FC236}">
-                <a16:creationId xmlns:a16="http://schemas.microsoft.com/office/drawing/2014/main" id="{917A0E96-B70D-158F-4746-3185481CB184}"/>
-              </a:ext>
-            </a:extLst>
-          </p:cNvPr>
-          <p:cNvCxnSpPr>
-            <a:cxnSpLocks/>
-          </p:cNvCxnSpPr>
-          <p:nvPr/>
-        </p:nvCxnSpPr>
-        <p:spPr>
-          <a:xfrm flipH="1" flipV="1">
-            <a:off x="636914" y="16920819"/>
-            <a:ext cx="24351535" cy="107361"/>
-          </a:xfrm>
-          <a:prstGeom prst="line">
-            <a:avLst/>
-          </a:prstGeom>
-          <a:ln w="38100"/>
-        </p:spPr>
-        <p:style>
-          <a:lnRef idx="1">
-            <a:schemeClr val="dk1"/>
-          </a:lnRef>
-          <a:fillRef idx="0">
-            <a:schemeClr val="dk1"/>
-          </a:fillRef>
-          <a:effectRef idx="0">
-            <a:schemeClr val="dk1"/>
-          </a:effectRef>
-          <a:fontRef idx="minor">
-            <a:schemeClr val="tx1"/>
-          </a:fontRef>
-        </p:style>
-      </p:cxnSp>
-      <p:sp>
-        <p:nvSpPr>
-          <p:cNvPr id="28" name="TextBox 27">
-            <a:extLst>
-              <a:ext uri="{FF2B5EF4-FFF2-40B4-BE49-F238E27FC236}">
-                <a16:creationId xmlns:a16="http://schemas.microsoft.com/office/drawing/2014/main" id="{89A67D55-1A79-ABE4-6ACD-DA72895C5E15}"/>
-              </a:ext>
-            </a:extLst>
-          </p:cNvPr>
-          <p:cNvSpPr txBox="1"/>
-          <p:nvPr/>
-        </p:nvSpPr>
-        <p:spPr>
-          <a:xfrm rot="16200000">
-            <a:off x="-935788" y="15089894"/>
-            <a:ext cx="2394796" cy="523220"/>
-          </a:xfrm>
-          <a:prstGeom prst="rect">
-            <a:avLst/>
-          </a:prstGeom>
-          <a:noFill/>
-        </p:spPr>
-        <p:txBody>
-          <a:bodyPr wrap="square" rtlCol="0">
-            <a:spAutoFit/>
-          </a:bodyPr>
-          <a:lstStyle/>
-          <a:p>
-            <a:pPr algn="ctr"/>
-            <a:r>
-              <a:rPr lang="en-US" sz="2800" dirty="0">
-                <a:solidFill>
-                  <a:srgbClr val="CD2626"/>
-                </a:solidFill>
-              </a:rPr>
-              <a:t>Temperature</a:t>
-            </a:r>
-            <a:endParaRPr lang="en-US" sz="3600" dirty="0">
-              <a:solidFill>
-                <a:srgbClr val="CD2626"/>
-              </a:solidFill>
-            </a:endParaRPr>
-          </a:p>
-        </p:txBody>
-      </p:sp>
-      <p:sp>
-        <p:nvSpPr>
-          <p:cNvPr id="29" name="TextBox 28">
-            <a:extLst>
-              <a:ext uri="{FF2B5EF4-FFF2-40B4-BE49-F238E27FC236}">
-                <a16:creationId xmlns:a16="http://schemas.microsoft.com/office/drawing/2014/main" id="{6CCDEB7F-FE22-B44C-63C3-C79B2BFD02E2}"/>
-              </a:ext>
-            </a:extLst>
-          </p:cNvPr>
-          <p:cNvSpPr txBox="1"/>
-          <p:nvPr/>
-        </p:nvSpPr>
-        <p:spPr>
-          <a:xfrm>
-            <a:off x="11331521" y="17028180"/>
-            <a:ext cx="2394796" cy="523220"/>
-          </a:xfrm>
-          <a:prstGeom prst="rect">
-            <a:avLst/>
-          </a:prstGeom>
-          <a:noFill/>
-        </p:spPr>
-        <p:txBody>
-          <a:bodyPr wrap="square" rtlCol="0">
-            <a:spAutoFit/>
-          </a:bodyPr>
-          <a:lstStyle/>
-          <a:p>
-            <a:pPr algn="ctr"/>
-            <a:r>
-              <a:rPr lang="en-US" sz="2800" dirty="0"/>
-              <a:t>Time</a:t>
-            </a:r>
-            <a:endParaRPr lang="en-US" sz="3600" dirty="0"/>
-          </a:p>
-        </p:txBody>
-      </p:sp>
       <p:sp>
         <p:nvSpPr>
           <p:cNvPr id="2" name="TextBox 1">
@@ -3668,6 +3508,14 @@
               <a:schemeClr val="tx1"/>
             </a:solidFill>
           </a:ln>
+          <a:effectLst>
+            <a:glow rad="228600">
+              <a:schemeClr val="accent6">
+                <a:satMod val="175000"/>
+                <a:alpha val="40000"/>
+              </a:schemeClr>
+            </a:glow>
+          </a:effectLst>
         </p:spPr>
         <p:style>
           <a:lnRef idx="2">
@@ -3726,6 +3574,14 @@
               <a:schemeClr val="tx1"/>
             </a:solidFill>
           </a:ln>
+          <a:effectLst>
+            <a:glow rad="228600">
+              <a:schemeClr val="accent6">
+                <a:satMod val="175000"/>
+                <a:alpha val="40000"/>
+              </a:schemeClr>
+            </a:glow>
+          </a:effectLst>
         </p:spPr>
         <p:style>
           <a:lnRef idx="2">
@@ -3784,6 +3640,14 @@
               <a:schemeClr val="tx1"/>
             </a:solidFill>
           </a:ln>
+          <a:effectLst>
+            <a:glow rad="228600">
+              <a:schemeClr val="accent6">
+                <a:satMod val="175000"/>
+                <a:alpha val="40000"/>
+              </a:schemeClr>
+            </a:glow>
+          </a:effectLst>
         </p:spPr>
         <p:style>
           <a:lnRef idx="2">
@@ -3842,6 +3706,14 @@
               <a:schemeClr val="tx1"/>
             </a:solidFill>
           </a:ln>
+          <a:effectLst>
+            <a:glow rad="228600">
+              <a:schemeClr val="accent6">
+                <a:satMod val="175000"/>
+                <a:alpha val="40000"/>
+              </a:schemeClr>
+            </a:glow>
+          </a:effectLst>
         </p:spPr>
         <p:style>
           <a:lnRef idx="2">
@@ -3892,9 +3764,7 @@
           <a:prstGeom prst="rect">
             <a:avLst/>
           </a:prstGeom>
-          <a:solidFill>
-            <a:srgbClr val="FFFBFB"/>
-          </a:solidFill>
+          <a:noFill/>
         </p:spPr>
         <p:txBody>
           <a:bodyPr wrap="square" rtlCol="0">
@@ -3904,7 +3774,11 @@
           <a:p>
             <a:pPr algn="ctr"/>
             <a:r>
-              <a:rPr lang="en-US" sz="6000" b="1" dirty="0"/>
+              <a:rPr lang="en-US" sz="6000" b="1" dirty="0">
+                <a:solidFill>
+                  <a:srgbClr val="C00000"/>
+                </a:solidFill>
+              </a:rPr>
               <a:t>DOM</a:t>
             </a:r>
           </a:p>
@@ -3931,13 +3805,21 @@
             <a:avLst/>
           </a:prstGeom>
           <a:solidFill>
-            <a:srgbClr val="FFFBFB"/>
+            <a:srgbClr val="C00000"/>
           </a:solidFill>
           <a:ln>
             <a:solidFill>
               <a:schemeClr val="tx1"/>
             </a:solidFill>
           </a:ln>
+          <a:effectLst>
+            <a:glow rad="228600">
+              <a:schemeClr val="accent6">
+                <a:satMod val="175000"/>
+                <a:alpha val="40000"/>
+              </a:schemeClr>
+            </a:glow>
+          </a:effectLst>
         </p:spPr>
         <p:style>
           <a:lnRef idx="2">
@@ -3989,13 +3871,21 @@
             <a:avLst/>
           </a:prstGeom>
           <a:solidFill>
-            <a:srgbClr val="FFFBFB"/>
+            <a:srgbClr val="C00000"/>
           </a:solidFill>
           <a:ln>
             <a:solidFill>
               <a:schemeClr val="tx1"/>
             </a:solidFill>
           </a:ln>
+          <a:effectLst>
+            <a:glow rad="228600">
+              <a:schemeClr val="accent6">
+                <a:satMod val="175000"/>
+                <a:alpha val="40000"/>
+              </a:schemeClr>
+            </a:glow>
+          </a:effectLst>
         </p:spPr>
         <p:style>
           <a:lnRef idx="2">
@@ -4047,13 +3937,21 @@
             <a:avLst/>
           </a:prstGeom>
           <a:solidFill>
-            <a:srgbClr val="FFFBFB"/>
+            <a:srgbClr val="C00000"/>
           </a:solidFill>
           <a:ln>
             <a:solidFill>
               <a:schemeClr val="tx1"/>
             </a:solidFill>
           </a:ln>
+          <a:effectLst>
+            <a:glow rad="228600">
+              <a:schemeClr val="accent6">
+                <a:satMod val="175000"/>
+                <a:alpha val="40000"/>
+              </a:schemeClr>
+            </a:glow>
+          </a:effectLst>
         </p:spPr>
         <p:style>
           <a:lnRef idx="2">
@@ -4105,13 +4003,21 @@
             <a:avLst/>
           </a:prstGeom>
           <a:solidFill>
-            <a:srgbClr val="FFFBFB"/>
+            <a:srgbClr val="C00000"/>
           </a:solidFill>
           <a:ln>
             <a:solidFill>
               <a:schemeClr val="tx1"/>
             </a:solidFill>
           </a:ln>
+          <a:effectLst>
+            <a:glow rad="228600">
+              <a:schemeClr val="accent6">
+                <a:satMod val="175000"/>
+                <a:alpha val="40000"/>
+              </a:schemeClr>
+            </a:glow>
+          </a:effectLst>
         </p:spPr>
         <p:style>
           <a:lnRef idx="2">
@@ -4162,9 +4068,7 @@
           <a:prstGeom prst="rect">
             <a:avLst/>
           </a:prstGeom>
-          <a:solidFill>
-            <a:srgbClr val="FFFBFB"/>
-          </a:solidFill>
+          <a:noFill/>
         </p:spPr>
         <p:txBody>
           <a:bodyPr wrap="square" rtlCol="0">
@@ -4173,10 +4077,18 @@
           <a:lstStyle/>
           <a:p>
             <a:r>
-              <a:rPr lang="en-US" sz="4400" b="1" dirty="0"/>
+              <a:rPr lang="en-US" sz="4400" b="1" dirty="0">
+                <a:solidFill>
+                  <a:srgbClr val="C00000"/>
+                </a:solidFill>
+              </a:rPr>
               <a:t>DOM</a:t>
             </a:r>
-            <a:endParaRPr lang="en-US" sz="3600" b="1" dirty="0"/>
+            <a:endParaRPr lang="en-US" sz="3600" b="1" dirty="0">
+              <a:solidFill>
+                <a:srgbClr val="C00000"/>
+              </a:solidFill>
+            </a:endParaRPr>
           </a:p>
         </p:txBody>
       </p:sp>
@@ -4201,13 +4113,21 @@
             <a:avLst/>
           </a:prstGeom>
           <a:solidFill>
-            <a:srgbClr val="FFFBFB"/>
+            <a:srgbClr val="C00000"/>
           </a:solidFill>
           <a:ln>
             <a:solidFill>
               <a:schemeClr val="tx1"/>
             </a:solidFill>
           </a:ln>
+          <a:effectLst>
+            <a:glow rad="228600">
+              <a:schemeClr val="accent6">
+                <a:satMod val="175000"/>
+                <a:alpha val="40000"/>
+              </a:schemeClr>
+            </a:glow>
+          </a:effectLst>
         </p:spPr>
         <p:style>
           <a:lnRef idx="2">
@@ -4259,13 +4179,21 @@
             <a:avLst/>
           </a:prstGeom>
           <a:solidFill>
-            <a:srgbClr val="FFFBFB"/>
+            <a:srgbClr val="C00000"/>
           </a:solidFill>
           <a:ln>
             <a:solidFill>
               <a:schemeClr val="tx1"/>
             </a:solidFill>
           </a:ln>
+          <a:effectLst>
+            <a:glow rad="228600">
+              <a:schemeClr val="accent6">
+                <a:satMod val="175000"/>
+                <a:alpha val="40000"/>
+              </a:schemeClr>
+            </a:glow>
+          </a:effectLst>
         </p:spPr>
         <p:style>
           <a:lnRef idx="2">
@@ -4317,13 +4245,21 @@
             <a:avLst/>
           </a:prstGeom>
           <a:solidFill>
-            <a:srgbClr val="FFFBFB"/>
+            <a:srgbClr val="C00000"/>
           </a:solidFill>
           <a:ln>
             <a:solidFill>
               <a:schemeClr val="tx1"/>
             </a:solidFill>
           </a:ln>
+          <a:effectLst>
+            <a:glow rad="228600">
+              <a:schemeClr val="accent6">
+                <a:satMod val="175000"/>
+                <a:alpha val="40000"/>
+              </a:schemeClr>
+            </a:glow>
+          </a:effectLst>
         </p:spPr>
         <p:style>
           <a:lnRef idx="2">
@@ -4375,13 +4311,21 @@
             <a:avLst/>
           </a:prstGeom>
           <a:solidFill>
-            <a:srgbClr val="FFFBFB"/>
+            <a:srgbClr val="C00000"/>
           </a:solidFill>
           <a:ln>
             <a:solidFill>
               <a:schemeClr val="tx1"/>
             </a:solidFill>
           </a:ln>
+          <a:effectLst>
+            <a:glow rad="228600">
+              <a:schemeClr val="accent6">
+                <a:satMod val="175000"/>
+                <a:alpha val="40000"/>
+              </a:schemeClr>
+            </a:glow>
+          </a:effectLst>
         </p:spPr>
         <p:style>
           <a:lnRef idx="2">
@@ -4432,9 +4376,15 @@
           <a:prstGeom prst="rect">
             <a:avLst/>
           </a:prstGeom>
-          <a:solidFill>
-            <a:srgbClr val="FFFBFB"/>
-          </a:solidFill>
+          <a:noFill/>
+          <a:effectLst>
+            <a:glow rad="228600">
+              <a:schemeClr val="accent6">
+                <a:satMod val="175000"/>
+                <a:alpha val="40000"/>
+              </a:schemeClr>
+            </a:glow>
+          </a:effectLst>
         </p:spPr>
         <p:txBody>
           <a:bodyPr wrap="square" rtlCol="0">
@@ -4443,7 +4393,11 @@
           <a:lstStyle/>
           <a:p>
             <a:r>
-              <a:rPr lang="en-US" sz="2400" b="1" dirty="0"/>
+              <a:rPr lang="en-US" sz="2400" b="1" dirty="0">
+                <a:solidFill>
+                  <a:srgbClr val="C00000"/>
+                </a:solidFill>
+              </a:rPr>
               <a:t>DOM</a:t>
             </a:r>
           </a:p>
@@ -4451,10 +4405,10 @@
       </p:sp>
       <p:sp>
         <p:nvSpPr>
-          <p:cNvPr id="42" name="Arrow: Down 41">
+          <p:cNvPr id="59" name="Arrow: Down 58">
             <a:extLst>
               <a:ext uri="{FF2B5EF4-FFF2-40B4-BE49-F238E27FC236}">
-                <a16:creationId xmlns:a16="http://schemas.microsoft.com/office/drawing/2014/main" id="{B29898D3-63EC-AE42-F6BB-8E06AD66DFF7}"/>
+                <a16:creationId xmlns:a16="http://schemas.microsoft.com/office/drawing/2014/main" id="{BF42F833-B97D-10B5-396A-4C426DDB664A}"/>
               </a:ext>
             </a:extLst>
           </p:cNvPr>
@@ -4462,15 +4416,15 @@
           <p:nvPr/>
         </p:nvSpPr>
         <p:spPr>
-          <a:xfrm rot="9455432" flipV="1">
-            <a:off x="15083516" y="8743565"/>
-            <a:ext cx="222509" cy="304059"/>
+          <a:xfrm rot="13875344">
+            <a:off x="10939837" y="4522882"/>
+            <a:ext cx="1279711" cy="2402425"/>
           </a:xfrm>
           <a:prstGeom prst="downArrow">
             <a:avLst/>
           </a:prstGeom>
           <a:solidFill>
-            <a:srgbClr val="FFFBFB"/>
+            <a:srgbClr val="C00000"/>
           </a:solidFill>
           <a:ln>
             <a:solidFill>
@@ -4507,12 +4461,133 @@
           </a:p>
         </p:txBody>
       </p:sp>
-      <p:sp>
-        <p:nvSpPr>
-          <p:cNvPr id="43" name="Arrow: Down 42">
+      <p:grpSp>
+        <p:nvGrpSpPr>
+          <p:cNvPr id="48" name="Group 47">
             <a:extLst>
               <a:ext uri="{FF2B5EF4-FFF2-40B4-BE49-F238E27FC236}">
-                <a16:creationId xmlns:a16="http://schemas.microsoft.com/office/drawing/2014/main" id="{83436B53-61A3-B2B7-D9D4-077E2CAA757F}"/>
+                <a16:creationId xmlns:a16="http://schemas.microsoft.com/office/drawing/2014/main" id="{1FB030D3-5EDB-4829-2FB8-8D876B66810F}"/>
+              </a:ext>
+            </a:extLst>
+          </p:cNvPr>
+          <p:cNvGrpSpPr/>
+          <p:nvPr/>
+        </p:nvGrpSpPr>
+        <p:grpSpPr>
+          <a:xfrm rot="2598087">
+            <a:off x="6687073" y="-543956"/>
+            <a:ext cx="4042507" cy="10080798"/>
+            <a:chOff x="4691671" y="3352800"/>
+            <a:chExt cx="2778411" cy="6304504"/>
+          </a:xfrm>
+        </p:grpSpPr>
+        <p:sp>
+          <p:nvSpPr>
+            <p:cNvPr id="181" name="Arrow: Curved Right 180">
+              <a:extLst>
+                <a:ext uri="{FF2B5EF4-FFF2-40B4-BE49-F238E27FC236}">
+                  <a16:creationId xmlns:a16="http://schemas.microsoft.com/office/drawing/2014/main" id="{84AC014F-F920-AE15-279A-9CFC369706E5}"/>
+                </a:ext>
+              </a:extLst>
+            </p:cNvPr>
+            <p:cNvSpPr/>
+            <p:nvPr/>
+          </p:nvSpPr>
+          <p:spPr>
+            <a:xfrm>
+              <a:off x="5601679" y="3352800"/>
+              <a:ext cx="1868403" cy="6304504"/>
+            </a:xfrm>
+            <a:prstGeom prst="curvedRightArrow">
+              <a:avLst/>
+            </a:prstGeom>
+            <a:solidFill>
+              <a:schemeClr val="bg1"/>
+            </a:solidFill>
+            <a:ln>
+              <a:solidFill>
+                <a:srgbClr val="CD2626"/>
+              </a:solidFill>
+            </a:ln>
+          </p:spPr>
+          <p:style>
+            <a:lnRef idx="2">
+              <a:schemeClr val="accent1">
+                <a:shade val="50000"/>
+              </a:schemeClr>
+            </a:lnRef>
+            <a:fillRef idx="1">
+              <a:schemeClr val="accent1"/>
+            </a:fillRef>
+            <a:effectRef idx="0">
+              <a:schemeClr val="accent1"/>
+            </a:effectRef>
+            <a:fontRef idx="minor">
+              <a:schemeClr val="lt1"/>
+            </a:fontRef>
+          </p:style>
+          <p:txBody>
+            <a:bodyPr rtlCol="0" anchor="ctr"/>
+            <a:lstStyle/>
+            <a:p>
+              <a:pPr algn="ctr"/>
+              <a:endParaRPr lang="en-US" dirty="0">
+                <a:solidFill>
+                  <a:schemeClr val="tx1"/>
+                </a:solidFill>
+              </a:endParaRPr>
+            </a:p>
+          </p:txBody>
+        </p:sp>
+        <p:sp>
+          <p:nvSpPr>
+            <p:cNvPr id="208" name="TextBox 207">
+              <a:extLst>
+                <a:ext uri="{FF2B5EF4-FFF2-40B4-BE49-F238E27FC236}">
+                  <a16:creationId xmlns:a16="http://schemas.microsoft.com/office/drawing/2014/main" id="{54AA77C7-B4D2-11AE-233F-6AEA58F7C819}"/>
+                </a:ext>
+              </a:extLst>
+            </p:cNvPr>
+            <p:cNvSpPr txBox="1"/>
+            <p:nvPr/>
+          </p:nvSpPr>
+          <p:spPr>
+            <a:xfrm rot="19001913">
+              <a:off x="4691671" y="5995033"/>
+              <a:ext cx="2050516" cy="849523"/>
+            </a:xfrm>
+            <a:prstGeom prst="rect">
+              <a:avLst/>
+            </a:prstGeom>
+            <a:solidFill>
+              <a:srgbClr val="C00000"/>
+            </a:solidFill>
+          </p:spPr>
+          <p:txBody>
+            <a:bodyPr wrap="square" rtlCol="0">
+              <a:spAutoFit/>
+            </a:bodyPr>
+            <a:lstStyle/>
+            <a:p>
+              <a:pPr algn="ctr"/>
+              <a:r>
+                <a:rPr lang="en-US" sz="4000" b="1" dirty="0">
+                  <a:solidFill>
+                    <a:schemeClr val="bg1"/>
+                  </a:solidFill>
+                </a:rPr>
+                <a:t>Hypoxia, disease </a:t>
+              </a:r>
+            </a:p>
+          </p:txBody>
+        </p:sp>
+      </p:grpSp>
+      <p:sp>
+        <p:nvSpPr>
+          <p:cNvPr id="212" name="Arrow: Down 211">
+            <a:extLst>
+              <a:ext uri="{FF2B5EF4-FFF2-40B4-BE49-F238E27FC236}">
+                <a16:creationId xmlns:a16="http://schemas.microsoft.com/office/drawing/2014/main" id="{1D11E7F2-8B25-F895-AE4A-BBA358703EBD}"/>
               </a:ext>
             </a:extLst>
           </p:cNvPr>
@@ -4520,16 +4595,14 @@
           <p:nvPr/>
         </p:nvSpPr>
         <p:spPr>
-          <a:xfrm rot="10800000" flipV="1">
-            <a:off x="15610029" y="8466153"/>
-            <a:ext cx="222508" cy="304059"/>
+          <a:xfrm rot="16200000">
+            <a:off x="5874377" y="10453669"/>
+            <a:ext cx="713624" cy="1203703"/>
           </a:xfrm>
           <a:prstGeom prst="downArrow">
             <a:avLst/>
           </a:prstGeom>
-          <a:solidFill>
-            <a:srgbClr val="FFFBFB"/>
-          </a:solidFill>
+          <a:noFill/>
           <a:ln>
             <a:solidFill>
               <a:schemeClr val="tx1"/>
@@ -4567,10 +4640,10 @@
       </p:sp>
       <p:sp>
         <p:nvSpPr>
-          <p:cNvPr id="44" name="Arrow: Down 43">
+          <p:cNvPr id="213" name="Arrow: Down 212">
             <a:extLst>
               <a:ext uri="{FF2B5EF4-FFF2-40B4-BE49-F238E27FC236}">
-                <a16:creationId xmlns:a16="http://schemas.microsoft.com/office/drawing/2014/main" id="{C9C40206-A8E2-E708-4088-664FCD5CD19A}"/>
+                <a16:creationId xmlns:a16="http://schemas.microsoft.com/office/drawing/2014/main" id="{8C6774FF-C9BD-7D87-F181-2E3B755536A4}"/>
               </a:ext>
             </a:extLst>
           </p:cNvPr>
@@ -4578,19 +4651,17 @@
           <p:nvPr/>
         </p:nvSpPr>
         <p:spPr>
-          <a:xfrm rot="10800000" flipV="1">
-            <a:off x="16443805" y="8465559"/>
-            <a:ext cx="222508" cy="304059"/>
+          <a:xfrm rot="16200000">
+            <a:off x="12380986" y="10504820"/>
+            <a:ext cx="713624" cy="1203703"/>
           </a:xfrm>
           <a:prstGeom prst="downArrow">
             <a:avLst/>
           </a:prstGeom>
-          <a:solidFill>
-            <a:srgbClr val="FFFBFB"/>
-          </a:solidFill>
+          <a:noFill/>
           <a:ln>
             <a:solidFill>
-              <a:schemeClr val="tx1"/>
+              <a:srgbClr val="C00000"/>
             </a:solidFill>
           </a:ln>
         </p:spPr>
@@ -4625,712 +4696,6 @@
       </p:sp>
       <p:sp>
         <p:nvSpPr>
-          <p:cNvPr id="45" name="Arrow: Down 44">
-            <a:extLst>
-              <a:ext uri="{FF2B5EF4-FFF2-40B4-BE49-F238E27FC236}">
-                <a16:creationId xmlns:a16="http://schemas.microsoft.com/office/drawing/2014/main" id="{75ED5E34-1BE6-9DFA-490B-1044A24DCCFF}"/>
-              </a:ext>
-            </a:extLst>
-          </p:cNvPr>
-          <p:cNvSpPr/>
-          <p:nvPr/>
-        </p:nvSpPr>
-        <p:spPr>
-          <a:xfrm rot="12103310" flipV="1">
-            <a:off x="17013313" y="8621865"/>
-            <a:ext cx="222508" cy="304059"/>
-          </a:xfrm>
-          <a:prstGeom prst="downArrow">
-            <a:avLst/>
-          </a:prstGeom>
-          <a:solidFill>
-            <a:srgbClr val="FFFBFB"/>
-          </a:solidFill>
-          <a:ln>
-            <a:solidFill>
-              <a:schemeClr val="tx1"/>
-            </a:solidFill>
-          </a:ln>
-        </p:spPr>
-        <p:style>
-          <a:lnRef idx="2">
-            <a:schemeClr val="accent1">
-              <a:shade val="50000"/>
-            </a:schemeClr>
-          </a:lnRef>
-          <a:fillRef idx="1">
-            <a:schemeClr val="accent1"/>
-          </a:fillRef>
-          <a:effectRef idx="0">
-            <a:schemeClr val="accent1"/>
-          </a:effectRef>
-          <a:fontRef idx="minor">
-            <a:schemeClr val="lt1"/>
-          </a:fontRef>
-        </p:style>
-        <p:txBody>
-          <a:bodyPr rtlCol="0" anchor="ctr"/>
-          <a:lstStyle/>
-          <a:p>
-            <a:pPr algn="ctr"/>
-            <a:endParaRPr lang="en-US" sz="2800">
-              <a:solidFill>
-                <a:srgbClr val="FF0000"/>
-              </a:solidFill>
-            </a:endParaRPr>
-          </a:p>
-        </p:txBody>
-      </p:sp>
-      <p:sp>
-        <p:nvSpPr>
-          <p:cNvPr id="58" name="Arrow: Down 57">
-            <a:extLst>
-              <a:ext uri="{FF2B5EF4-FFF2-40B4-BE49-F238E27FC236}">
-                <a16:creationId xmlns:a16="http://schemas.microsoft.com/office/drawing/2014/main" id="{AF0AE497-C76C-CC63-C97B-2756594EA522}"/>
-              </a:ext>
-            </a:extLst>
-          </p:cNvPr>
-          <p:cNvSpPr/>
-          <p:nvPr/>
-        </p:nvSpPr>
-        <p:spPr>
-          <a:xfrm rot="10800000">
-            <a:off x="2756267" y="6517768"/>
-            <a:ext cx="321047" cy="588349"/>
-          </a:xfrm>
-          <a:prstGeom prst="downArrow">
-            <a:avLst/>
-          </a:prstGeom>
-          <a:solidFill>
-            <a:srgbClr val="FFFBFB"/>
-          </a:solidFill>
-          <a:ln>
-            <a:solidFill>
-              <a:schemeClr val="tx1"/>
-            </a:solidFill>
-          </a:ln>
-        </p:spPr>
-        <p:style>
-          <a:lnRef idx="2">
-            <a:schemeClr val="accent1">
-              <a:shade val="50000"/>
-            </a:schemeClr>
-          </a:lnRef>
-          <a:fillRef idx="1">
-            <a:schemeClr val="accent1"/>
-          </a:fillRef>
-          <a:effectRef idx="0">
-            <a:schemeClr val="accent1"/>
-          </a:effectRef>
-          <a:fontRef idx="minor">
-            <a:schemeClr val="lt1"/>
-          </a:fontRef>
-        </p:style>
-        <p:txBody>
-          <a:bodyPr rtlCol="0" anchor="ctr"/>
-          <a:lstStyle/>
-          <a:p>
-            <a:pPr algn="ctr"/>
-            <a:endParaRPr lang="en-US" sz="2800">
-              <a:solidFill>
-                <a:srgbClr val="FF0000"/>
-              </a:solidFill>
-            </a:endParaRPr>
-          </a:p>
-        </p:txBody>
-      </p:sp>
-      <p:sp>
-        <p:nvSpPr>
-          <p:cNvPr id="59" name="Arrow: Down 58">
-            <a:extLst>
-              <a:ext uri="{FF2B5EF4-FFF2-40B4-BE49-F238E27FC236}">
-                <a16:creationId xmlns:a16="http://schemas.microsoft.com/office/drawing/2014/main" id="{BF42F833-B97D-10B5-396A-4C426DDB664A}"/>
-              </a:ext>
-            </a:extLst>
-          </p:cNvPr>
-          <p:cNvSpPr/>
-          <p:nvPr/>
-        </p:nvSpPr>
-        <p:spPr>
-          <a:xfrm rot="10800000">
-            <a:off x="9112440" y="5430130"/>
-            <a:ext cx="713623" cy="1203703"/>
-          </a:xfrm>
-          <a:prstGeom prst="downArrow">
-            <a:avLst/>
-          </a:prstGeom>
-          <a:solidFill>
-            <a:srgbClr val="FFFBFB"/>
-          </a:solidFill>
-          <a:ln>
-            <a:solidFill>
-              <a:schemeClr val="tx1"/>
-            </a:solidFill>
-          </a:ln>
-        </p:spPr>
-        <p:style>
-          <a:lnRef idx="2">
-            <a:schemeClr val="accent1">
-              <a:shade val="50000"/>
-            </a:schemeClr>
-          </a:lnRef>
-          <a:fillRef idx="1">
-            <a:schemeClr val="accent1"/>
-          </a:fillRef>
-          <a:effectRef idx="0">
-            <a:schemeClr val="accent1"/>
-          </a:effectRef>
-          <a:fontRef idx="minor">
-            <a:schemeClr val="lt1"/>
-          </a:fontRef>
-        </p:style>
-        <p:txBody>
-          <a:bodyPr rtlCol="0" anchor="ctr"/>
-          <a:lstStyle/>
-          <a:p>
-            <a:pPr algn="ctr"/>
-            <a:endParaRPr lang="en-US" sz="2800">
-              <a:solidFill>
-                <a:srgbClr val="FF0000"/>
-              </a:solidFill>
-            </a:endParaRPr>
-          </a:p>
-        </p:txBody>
-      </p:sp>
-      <p:sp>
-        <p:nvSpPr>
-          <p:cNvPr id="172" name="Arrow: Down 171">
-            <a:extLst>
-              <a:ext uri="{FF2B5EF4-FFF2-40B4-BE49-F238E27FC236}">
-                <a16:creationId xmlns:a16="http://schemas.microsoft.com/office/drawing/2014/main" id="{D66B9C18-BA02-37BE-568F-40F3F86E24A7}"/>
-              </a:ext>
-            </a:extLst>
-          </p:cNvPr>
-          <p:cNvSpPr/>
-          <p:nvPr/>
-        </p:nvSpPr>
-        <p:spPr>
-          <a:xfrm rot="10800000">
-            <a:off x="15978646" y="7035061"/>
-            <a:ext cx="505156" cy="818528"/>
-          </a:xfrm>
-          <a:prstGeom prst="downArrow">
-            <a:avLst/>
-          </a:prstGeom>
-          <a:solidFill>
-            <a:srgbClr val="FFFBFB"/>
-          </a:solidFill>
-          <a:ln>
-            <a:solidFill>
-              <a:schemeClr val="tx1"/>
-            </a:solidFill>
-          </a:ln>
-        </p:spPr>
-        <p:style>
-          <a:lnRef idx="2">
-            <a:schemeClr val="accent1">
-              <a:shade val="50000"/>
-            </a:schemeClr>
-          </a:lnRef>
-          <a:fillRef idx="1">
-            <a:schemeClr val="accent1"/>
-          </a:fillRef>
-          <a:effectRef idx="0">
-            <a:schemeClr val="accent1"/>
-          </a:effectRef>
-          <a:fontRef idx="minor">
-            <a:schemeClr val="lt1"/>
-          </a:fontRef>
-        </p:style>
-        <p:txBody>
-          <a:bodyPr rtlCol="0" anchor="ctr"/>
-          <a:lstStyle/>
-          <a:p>
-            <a:pPr algn="ctr"/>
-            <a:endParaRPr lang="en-US" sz="2800">
-              <a:solidFill>
-                <a:srgbClr val="FF0000"/>
-              </a:solidFill>
-            </a:endParaRPr>
-          </a:p>
-        </p:txBody>
-      </p:sp>
-      <p:sp>
-        <p:nvSpPr>
-          <p:cNvPr id="173" name="Arrow: Down 172">
-            <a:extLst>
-              <a:ext uri="{FF2B5EF4-FFF2-40B4-BE49-F238E27FC236}">
-                <a16:creationId xmlns:a16="http://schemas.microsoft.com/office/drawing/2014/main" id="{AF204040-A46A-6EED-CF93-299C2BBEFDA8}"/>
-              </a:ext>
-            </a:extLst>
-          </p:cNvPr>
-          <p:cNvSpPr/>
-          <p:nvPr/>
-        </p:nvSpPr>
-        <p:spPr>
-          <a:xfrm rot="10800000">
-            <a:off x="22738380" y="6305407"/>
-            <a:ext cx="505156" cy="818528"/>
-          </a:xfrm>
-          <a:prstGeom prst="downArrow">
-            <a:avLst/>
-          </a:prstGeom>
-          <a:solidFill>
-            <a:srgbClr val="FFFBFB"/>
-          </a:solidFill>
-          <a:ln>
-            <a:solidFill>
-              <a:schemeClr val="tx1"/>
-            </a:solidFill>
-          </a:ln>
-        </p:spPr>
-        <p:style>
-          <a:lnRef idx="2">
-            <a:schemeClr val="accent1">
-              <a:shade val="50000"/>
-            </a:schemeClr>
-          </a:lnRef>
-          <a:fillRef idx="1">
-            <a:schemeClr val="accent1"/>
-          </a:fillRef>
-          <a:effectRef idx="0">
-            <a:schemeClr val="accent1"/>
-          </a:effectRef>
-          <a:fontRef idx="minor">
-            <a:schemeClr val="lt1"/>
-          </a:fontRef>
-        </p:style>
-        <p:txBody>
-          <a:bodyPr rtlCol="0" anchor="ctr"/>
-          <a:lstStyle/>
-          <a:p>
-            <a:pPr algn="ctr"/>
-            <a:endParaRPr lang="en-US" sz="2800">
-              <a:solidFill>
-                <a:srgbClr val="FF0000"/>
-              </a:solidFill>
-            </a:endParaRPr>
-          </a:p>
-        </p:txBody>
-      </p:sp>
-      <p:sp>
-        <p:nvSpPr>
-          <p:cNvPr id="180" name="Arrow: Curved Right 179">
-            <a:extLst>
-              <a:ext uri="{FF2B5EF4-FFF2-40B4-BE49-F238E27FC236}">
-                <a16:creationId xmlns:a16="http://schemas.microsoft.com/office/drawing/2014/main" id="{4B207699-4842-F962-683E-7920101877C5}"/>
-              </a:ext>
-            </a:extLst>
-          </p:cNvPr>
-          <p:cNvSpPr/>
-          <p:nvPr/>
-        </p:nvSpPr>
-        <p:spPr>
-          <a:xfrm>
-            <a:off x="12897163" y="5430130"/>
-            <a:ext cx="1739375" cy="4087354"/>
-          </a:xfrm>
-          <a:prstGeom prst="curvedRightArrow">
-            <a:avLst/>
-          </a:prstGeom>
-          <a:solidFill>
-            <a:schemeClr val="bg1"/>
-          </a:solidFill>
-          <a:ln>
-            <a:solidFill>
-              <a:srgbClr val="CD2626"/>
-            </a:solidFill>
-          </a:ln>
-        </p:spPr>
-        <p:style>
-          <a:lnRef idx="2">
-            <a:schemeClr val="accent1">
-              <a:shade val="50000"/>
-            </a:schemeClr>
-          </a:lnRef>
-          <a:fillRef idx="1">
-            <a:schemeClr val="accent1"/>
-          </a:fillRef>
-          <a:effectRef idx="0">
-            <a:schemeClr val="accent1"/>
-          </a:effectRef>
-          <a:fontRef idx="minor">
-            <a:schemeClr val="lt1"/>
-          </a:fontRef>
-        </p:style>
-        <p:txBody>
-          <a:bodyPr rtlCol="0" anchor="ctr"/>
-          <a:lstStyle/>
-          <a:p>
-            <a:pPr algn="ctr"/>
-            <a:endParaRPr lang="en-US">
-              <a:solidFill>
-                <a:schemeClr val="tx1"/>
-              </a:solidFill>
-            </a:endParaRPr>
-          </a:p>
-        </p:txBody>
-      </p:sp>
-      <p:sp>
-        <p:nvSpPr>
-          <p:cNvPr id="181" name="Arrow: Curved Right 180">
-            <a:extLst>
-              <a:ext uri="{FF2B5EF4-FFF2-40B4-BE49-F238E27FC236}">
-                <a16:creationId xmlns:a16="http://schemas.microsoft.com/office/drawing/2014/main" id="{84AC014F-F920-AE15-279A-9CFC369706E5}"/>
-              </a:ext>
-            </a:extLst>
-          </p:cNvPr>
-          <p:cNvSpPr/>
-          <p:nvPr/>
-        </p:nvSpPr>
-        <p:spPr>
-          <a:xfrm>
-            <a:off x="5601679" y="3352800"/>
-            <a:ext cx="1868403" cy="6304504"/>
-          </a:xfrm>
-          <a:prstGeom prst="curvedRightArrow">
-            <a:avLst/>
-          </a:prstGeom>
-          <a:solidFill>
-            <a:schemeClr val="bg1"/>
-          </a:solidFill>
-          <a:ln>
-            <a:solidFill>
-              <a:srgbClr val="CD2626"/>
-            </a:solidFill>
-          </a:ln>
-        </p:spPr>
-        <p:style>
-          <a:lnRef idx="2">
-            <a:schemeClr val="accent1">
-              <a:shade val="50000"/>
-            </a:schemeClr>
-          </a:lnRef>
-          <a:fillRef idx="1">
-            <a:schemeClr val="accent1"/>
-          </a:fillRef>
-          <a:effectRef idx="0">
-            <a:schemeClr val="accent1"/>
-          </a:effectRef>
-          <a:fontRef idx="minor">
-            <a:schemeClr val="lt1"/>
-          </a:fontRef>
-        </p:style>
-        <p:txBody>
-          <a:bodyPr rtlCol="0" anchor="ctr"/>
-          <a:lstStyle/>
-          <a:p>
-            <a:pPr algn="ctr"/>
-            <a:endParaRPr lang="en-US">
-              <a:solidFill>
-                <a:schemeClr val="tx1"/>
-              </a:solidFill>
-            </a:endParaRPr>
-          </a:p>
-        </p:txBody>
-      </p:sp>
-      <p:sp>
-        <p:nvSpPr>
-          <p:cNvPr id="182" name="Arrow: Curved Right 181">
-            <a:extLst>
-              <a:ext uri="{FF2B5EF4-FFF2-40B4-BE49-F238E27FC236}">
-                <a16:creationId xmlns:a16="http://schemas.microsoft.com/office/drawing/2014/main" id="{AEC96ED3-DCE5-5E01-0396-236C3B711A7D}"/>
-              </a:ext>
-            </a:extLst>
-          </p:cNvPr>
-          <p:cNvSpPr/>
-          <p:nvPr/>
-        </p:nvSpPr>
-        <p:spPr>
-          <a:xfrm>
-            <a:off x="19584855" y="4897917"/>
-            <a:ext cx="1739375" cy="4637266"/>
-          </a:xfrm>
-          <a:prstGeom prst="curvedRightArrow">
-            <a:avLst/>
-          </a:prstGeom>
-          <a:solidFill>
-            <a:schemeClr val="bg1"/>
-          </a:solidFill>
-          <a:ln>
-            <a:solidFill>
-              <a:srgbClr val="CD2626"/>
-            </a:solidFill>
-          </a:ln>
-        </p:spPr>
-        <p:style>
-          <a:lnRef idx="2">
-            <a:schemeClr val="accent1">
-              <a:shade val="50000"/>
-            </a:schemeClr>
-          </a:lnRef>
-          <a:fillRef idx="1">
-            <a:schemeClr val="accent1"/>
-          </a:fillRef>
-          <a:effectRef idx="0">
-            <a:schemeClr val="accent1"/>
-          </a:effectRef>
-          <a:fontRef idx="minor">
-            <a:schemeClr val="lt1"/>
-          </a:fontRef>
-        </p:style>
-        <p:txBody>
-          <a:bodyPr rtlCol="0" anchor="ctr"/>
-          <a:lstStyle/>
-          <a:p>
-            <a:pPr algn="ctr"/>
-            <a:endParaRPr lang="en-US">
-              <a:solidFill>
-                <a:schemeClr val="tx1"/>
-              </a:solidFill>
-            </a:endParaRPr>
-          </a:p>
-        </p:txBody>
-      </p:sp>
-      <p:sp>
-        <p:nvSpPr>
-          <p:cNvPr id="208" name="TextBox 207">
-            <a:extLst>
-              <a:ext uri="{FF2B5EF4-FFF2-40B4-BE49-F238E27FC236}">
-                <a16:creationId xmlns:a16="http://schemas.microsoft.com/office/drawing/2014/main" id="{54AA77C7-B4D2-11AE-233F-6AEA58F7C819}"/>
-              </a:ext>
-            </a:extLst>
-          </p:cNvPr>
-          <p:cNvSpPr txBox="1"/>
-          <p:nvPr/>
-        </p:nvSpPr>
-        <p:spPr>
-          <a:xfrm>
-            <a:off x="4932816" y="5783843"/>
-            <a:ext cx="2415260" cy="1345000"/>
-          </a:xfrm>
-          <a:prstGeom prst="rect">
-            <a:avLst/>
-          </a:prstGeom>
-          <a:solidFill>
-            <a:srgbClr val="C00000"/>
-          </a:solidFill>
-        </p:spPr>
-        <p:txBody>
-          <a:bodyPr wrap="square" rtlCol="0">
-            <a:spAutoFit/>
-          </a:bodyPr>
-          <a:lstStyle/>
-          <a:p>
-            <a:pPr algn="ctr"/>
-            <a:r>
-              <a:rPr lang="en-US" sz="4000" b="1" dirty="0">
-                <a:solidFill>
-                  <a:schemeClr val="bg1"/>
-                </a:solidFill>
-              </a:rPr>
-              <a:t>Hypoxia, disease</a:t>
-            </a:r>
-          </a:p>
-        </p:txBody>
-      </p:sp>
-      <p:sp>
-        <p:nvSpPr>
-          <p:cNvPr id="209" name="TextBox 208">
-            <a:extLst>
-              <a:ext uri="{FF2B5EF4-FFF2-40B4-BE49-F238E27FC236}">
-                <a16:creationId xmlns:a16="http://schemas.microsoft.com/office/drawing/2014/main" id="{68FCF598-07AD-35F3-61BE-3DDF4C473140}"/>
-              </a:ext>
-            </a:extLst>
-          </p:cNvPr>
-          <p:cNvSpPr txBox="1"/>
-          <p:nvPr/>
-        </p:nvSpPr>
-        <p:spPr>
-          <a:xfrm>
-            <a:off x="12394654" y="6714670"/>
-            <a:ext cx="2415260" cy="1077218"/>
-          </a:xfrm>
-          <a:prstGeom prst="rect">
-            <a:avLst/>
-          </a:prstGeom>
-          <a:solidFill>
-            <a:srgbClr val="C00000"/>
-          </a:solidFill>
-        </p:spPr>
-        <p:txBody>
-          <a:bodyPr wrap="square" rtlCol="0">
-            <a:spAutoFit/>
-          </a:bodyPr>
-          <a:lstStyle/>
-          <a:p>
-            <a:pPr algn="ctr"/>
-            <a:r>
-              <a:rPr lang="en-US" sz="3200" b="1" dirty="0">
-                <a:solidFill>
-                  <a:schemeClr val="bg1"/>
-                </a:solidFill>
-              </a:rPr>
-              <a:t>Hypoxia, disease</a:t>
-            </a:r>
-          </a:p>
-        </p:txBody>
-      </p:sp>
-      <p:sp>
-        <p:nvSpPr>
-          <p:cNvPr id="211" name="TextBox 210">
-            <a:extLst>
-              <a:ext uri="{FF2B5EF4-FFF2-40B4-BE49-F238E27FC236}">
-                <a16:creationId xmlns:a16="http://schemas.microsoft.com/office/drawing/2014/main" id="{9C0BF294-097E-B8F9-0658-11FADC1EF141}"/>
-              </a:ext>
-            </a:extLst>
-          </p:cNvPr>
-          <p:cNvSpPr txBox="1"/>
-          <p:nvPr/>
-        </p:nvSpPr>
-        <p:spPr>
-          <a:xfrm>
-            <a:off x="19087755" y="6533507"/>
-            <a:ext cx="2415260" cy="1077218"/>
-          </a:xfrm>
-          <a:prstGeom prst="rect">
-            <a:avLst/>
-          </a:prstGeom>
-          <a:solidFill>
-            <a:srgbClr val="C00000"/>
-          </a:solidFill>
-        </p:spPr>
-        <p:txBody>
-          <a:bodyPr wrap="square" rtlCol="0">
-            <a:spAutoFit/>
-          </a:bodyPr>
-          <a:lstStyle/>
-          <a:p>
-            <a:pPr algn="ctr"/>
-            <a:r>
-              <a:rPr lang="en-US" sz="3200" b="1" dirty="0">
-                <a:solidFill>
-                  <a:schemeClr val="bg1"/>
-                </a:solidFill>
-              </a:rPr>
-              <a:t>Hypoxia, disease</a:t>
-            </a:r>
-          </a:p>
-        </p:txBody>
-      </p:sp>
-      <p:sp>
-        <p:nvSpPr>
-          <p:cNvPr id="212" name="Arrow: Down 211">
-            <a:extLst>
-              <a:ext uri="{FF2B5EF4-FFF2-40B4-BE49-F238E27FC236}">
-                <a16:creationId xmlns:a16="http://schemas.microsoft.com/office/drawing/2014/main" id="{1D11E7F2-8B25-F895-AE4A-BBA358703EBD}"/>
-              </a:ext>
-            </a:extLst>
-          </p:cNvPr>
-          <p:cNvSpPr/>
-          <p:nvPr/>
-        </p:nvSpPr>
-        <p:spPr>
-          <a:xfrm rot="16200000">
-            <a:off x="5874377" y="10453669"/>
-            <a:ext cx="713624" cy="1203703"/>
-          </a:xfrm>
-          <a:prstGeom prst="downArrow">
-            <a:avLst/>
-          </a:prstGeom>
-          <a:solidFill>
-            <a:schemeClr val="tx1"/>
-          </a:solidFill>
-          <a:ln>
-            <a:solidFill>
-              <a:schemeClr val="tx1"/>
-            </a:solidFill>
-          </a:ln>
-        </p:spPr>
-        <p:style>
-          <a:lnRef idx="2">
-            <a:schemeClr val="accent1">
-              <a:shade val="50000"/>
-            </a:schemeClr>
-          </a:lnRef>
-          <a:fillRef idx="1">
-            <a:schemeClr val="accent1"/>
-          </a:fillRef>
-          <a:effectRef idx="0">
-            <a:schemeClr val="accent1"/>
-          </a:effectRef>
-          <a:fontRef idx="minor">
-            <a:schemeClr val="lt1"/>
-          </a:fontRef>
-        </p:style>
-        <p:txBody>
-          <a:bodyPr rtlCol="0" anchor="ctr"/>
-          <a:lstStyle/>
-          <a:p>
-            <a:pPr algn="ctr"/>
-            <a:endParaRPr lang="en-US" sz="2800">
-              <a:solidFill>
-                <a:srgbClr val="FF0000"/>
-              </a:solidFill>
-            </a:endParaRPr>
-          </a:p>
-        </p:txBody>
-      </p:sp>
-      <p:sp>
-        <p:nvSpPr>
-          <p:cNvPr id="213" name="Arrow: Down 212">
-            <a:extLst>
-              <a:ext uri="{FF2B5EF4-FFF2-40B4-BE49-F238E27FC236}">
-                <a16:creationId xmlns:a16="http://schemas.microsoft.com/office/drawing/2014/main" id="{8C6774FF-C9BD-7D87-F181-2E3B755536A4}"/>
-              </a:ext>
-            </a:extLst>
-          </p:cNvPr>
-          <p:cNvSpPr/>
-          <p:nvPr/>
-        </p:nvSpPr>
-        <p:spPr>
-          <a:xfrm rot="16200000">
-            <a:off x="12380986" y="10504820"/>
-            <a:ext cx="713624" cy="1203703"/>
-          </a:xfrm>
-          <a:prstGeom prst="downArrow">
-            <a:avLst/>
-          </a:prstGeom>
-          <a:solidFill>
-            <a:schemeClr val="tx1"/>
-          </a:solidFill>
-          <a:ln>
-            <a:solidFill>
-              <a:schemeClr val="tx1"/>
-            </a:solidFill>
-          </a:ln>
-        </p:spPr>
-        <p:style>
-          <a:lnRef idx="2">
-            <a:schemeClr val="accent1">
-              <a:shade val="50000"/>
-            </a:schemeClr>
-          </a:lnRef>
-          <a:fillRef idx="1">
-            <a:schemeClr val="accent1"/>
-          </a:fillRef>
-          <a:effectRef idx="0">
-            <a:schemeClr val="accent1"/>
-          </a:effectRef>
-          <a:fontRef idx="minor">
-            <a:schemeClr val="lt1"/>
-          </a:fontRef>
-        </p:style>
-        <p:txBody>
-          <a:bodyPr rtlCol="0" anchor="ctr"/>
-          <a:lstStyle/>
-          <a:p>
-            <a:pPr algn="ctr"/>
-            <a:endParaRPr lang="en-US" sz="2800">
-              <a:solidFill>
-                <a:srgbClr val="FF0000"/>
-              </a:solidFill>
-            </a:endParaRPr>
-          </a:p>
-        </p:txBody>
-      </p:sp>
-      <p:sp>
-        <p:nvSpPr>
           <p:cNvPr id="214" name="Arrow: Down 213">
             <a:extLst>
               <a:ext uri="{FF2B5EF4-FFF2-40B4-BE49-F238E27FC236}">
@@ -5349,12 +4714,10 @@
           <a:prstGeom prst="downArrow">
             <a:avLst/>
           </a:prstGeom>
-          <a:solidFill>
-            <a:schemeClr val="tx1"/>
-          </a:solidFill>
+          <a:noFill/>
           <a:ln>
             <a:solidFill>
-              <a:schemeClr val="tx1"/>
+              <a:srgbClr val="C00000"/>
             </a:solidFill>
           </a:ln>
         </p:spPr>
@@ -5425,10 +4788,10 @@
       </p:pic>
       <p:pic>
         <p:nvPicPr>
-          <p:cNvPr id="30" name="Picture 29" descr="Chart, pie chart&#10;&#10;Description automatically generated">
+          <p:cNvPr id="215" name="Picture 214" descr="Chart, pie chart&#10;&#10;Description automatically generated">
             <a:extLst>
               <a:ext uri="{FF2B5EF4-FFF2-40B4-BE49-F238E27FC236}">
-                <a16:creationId xmlns:a16="http://schemas.microsoft.com/office/drawing/2014/main" id="{19185A00-9829-8E49-53C6-7856DF7D3F48}"/>
+                <a16:creationId xmlns:a16="http://schemas.microsoft.com/office/drawing/2014/main" id="{3C454881-AAB9-82B4-175C-064785FABF8B}"/>
               </a:ext>
             </a:extLst>
           </p:cNvPr>
@@ -5451,80 +4814,8 @@
         </p:blipFill>
         <p:spPr>
           <a:xfrm>
-            <a:off x="14784092" y="4286118"/>
-            <a:ext cx="2889513" cy="2889513"/>
-          </a:xfrm>
-          <a:prstGeom prst="rect">
-            <a:avLst/>
-          </a:prstGeom>
-        </p:spPr>
-      </p:pic>
-      <p:pic>
-        <p:nvPicPr>
-          <p:cNvPr id="179" name="Picture 178" descr="Chart, pie chart&#10;&#10;Description automatically generated">
-            <a:extLst>
-              <a:ext uri="{FF2B5EF4-FFF2-40B4-BE49-F238E27FC236}">
-                <a16:creationId xmlns:a16="http://schemas.microsoft.com/office/drawing/2014/main" id="{0DAF4566-69AE-7602-468A-B91D643E5106}"/>
-              </a:ext>
-            </a:extLst>
-          </p:cNvPr>
-          <p:cNvPicPr>
-            <a:picLocks noChangeAspect="1"/>
-          </p:cNvPicPr>
-          <p:nvPr/>
-        </p:nvPicPr>
-        <p:blipFill>
-          <a:blip r:embed="rId6">
-            <a:extLst>
-              <a:ext uri="{28A0092B-C50C-407E-A947-70E740481C1C}">
-                <a14:useLocalDpi xmlns:a14="http://schemas.microsoft.com/office/drawing/2010/main" val="0"/>
-              </a:ext>
-            </a:extLst>
-          </a:blip>
-          <a:stretch>
-            <a:fillRect/>
-          </a:stretch>
-        </p:blipFill>
-        <p:spPr>
-          <a:xfrm>
-            <a:off x="21830321" y="3966582"/>
-            <a:ext cx="2381618" cy="2381618"/>
-          </a:xfrm>
-          <a:prstGeom prst="rect">
-            <a:avLst/>
-          </a:prstGeom>
-        </p:spPr>
-      </p:pic>
-      <p:pic>
-        <p:nvPicPr>
-          <p:cNvPr id="215" name="Picture 214" descr="Chart, pie chart&#10;&#10;Description automatically generated">
-            <a:extLst>
-              <a:ext uri="{FF2B5EF4-FFF2-40B4-BE49-F238E27FC236}">
-                <a16:creationId xmlns:a16="http://schemas.microsoft.com/office/drawing/2014/main" id="{3C454881-AAB9-82B4-175C-064785FABF8B}"/>
-              </a:ext>
-            </a:extLst>
-          </p:cNvPr>
-          <p:cNvPicPr>
-            <a:picLocks noChangeAspect="1"/>
-          </p:cNvPicPr>
-          <p:nvPr/>
-        </p:nvPicPr>
-        <p:blipFill>
-          <a:blip r:embed="rId7">
-            <a:extLst>
-              <a:ext uri="{28A0092B-C50C-407E-A947-70E740481C1C}">
-                <a14:useLocalDpi xmlns:a14="http://schemas.microsoft.com/office/drawing/2010/main" val="0"/>
-              </a:ext>
-            </a:extLst>
-          </a:blip>
-          <a:stretch>
-            <a:fillRect/>
-          </a:stretch>
-        </p:blipFill>
-        <p:spPr>
-          <a:xfrm>
-            <a:off x="7310468" y="1445426"/>
-            <a:ext cx="4248477" cy="4248477"/>
+            <a:off x="13445479" y="798017"/>
+            <a:ext cx="5420708" cy="5420708"/>
           </a:xfrm>
           <a:prstGeom prst="rect">
             <a:avLst/>
@@ -5546,7 +4837,7 @@
           <p:nvPr/>
         </p:nvPicPr>
         <p:blipFill rotWithShape="1">
-          <a:blip r:embed="rId8">
+          <a:blip r:embed="rId6">
             <a:extLst>
               <a:ext uri="{28A0092B-C50C-407E-A947-70E740481C1C}">
                 <a14:useLocalDpi xmlns:a14="http://schemas.microsoft.com/office/drawing/2010/main" val="0"/>
@@ -5558,7 +4849,7 @@
         </p:blipFill>
         <p:spPr>
           <a:xfrm>
-            <a:off x="496109" y="519323"/>
+            <a:off x="1241239" y="575289"/>
             <a:ext cx="3387549" cy="2976505"/>
           </a:xfrm>
           <a:prstGeom prst="rect">
@@ -5621,7 +4912,7 @@
         </p:nvSpPr>
         <p:spPr>
           <a:xfrm>
-            <a:off x="7388654" y="1153038"/>
+            <a:off x="14109781" y="550470"/>
             <a:ext cx="4092104" cy="584775"/>
           </a:xfrm>
           <a:prstGeom prst="rect">
@@ -5652,12 +4943,973 @@
           </a:p>
         </p:txBody>
       </p:sp>
+      <p:grpSp>
+        <p:nvGrpSpPr>
+          <p:cNvPr id="46" name="Group 45">
+            <a:extLst>
+              <a:ext uri="{FF2B5EF4-FFF2-40B4-BE49-F238E27FC236}">
+                <a16:creationId xmlns:a16="http://schemas.microsoft.com/office/drawing/2014/main" id="{08B777E4-D423-DACD-9DA7-FDF61AB0653B}"/>
+              </a:ext>
+            </a:extLst>
+          </p:cNvPr>
+          <p:cNvGrpSpPr/>
+          <p:nvPr/>
+        </p:nvGrpSpPr>
+        <p:grpSpPr>
+          <a:xfrm>
+            <a:off x="1211653" y="13997021"/>
+            <a:ext cx="24250562" cy="8275149"/>
+            <a:chOff x="1181621" y="19942589"/>
+            <a:chExt cx="22463051" cy="7578808"/>
+          </a:xfrm>
+        </p:grpSpPr>
+        <p:sp>
+          <p:nvSpPr>
+            <p:cNvPr id="28" name="TextBox 27">
+              <a:extLst>
+                <a:ext uri="{FF2B5EF4-FFF2-40B4-BE49-F238E27FC236}">
+                  <a16:creationId xmlns:a16="http://schemas.microsoft.com/office/drawing/2014/main" id="{89A67D55-1A79-ABE4-6ACD-DA72895C5E15}"/>
+                </a:ext>
+              </a:extLst>
+            </p:cNvPr>
+            <p:cNvSpPr txBox="1"/>
+            <p:nvPr/>
+          </p:nvSpPr>
+          <p:spPr>
+            <a:xfrm rot="5400000">
+              <a:off x="21869272" y="22670216"/>
+              <a:ext cx="2842913" cy="707886"/>
+            </a:xfrm>
+            <a:prstGeom prst="rect">
+              <a:avLst/>
+            </a:prstGeom>
+            <a:noFill/>
+          </p:spPr>
+          <p:txBody>
+            <a:bodyPr wrap="square" rtlCol="0">
+              <a:spAutoFit/>
+            </a:bodyPr>
+            <a:lstStyle/>
+            <a:p>
+              <a:pPr algn="ctr"/>
+              <a:r>
+                <a:rPr lang="en-US" sz="4000" dirty="0">
+                  <a:solidFill>
+                    <a:srgbClr val="CD2626"/>
+                  </a:solidFill>
+                </a:rPr>
+                <a:t>Temperature</a:t>
+              </a:r>
+              <a:endParaRPr lang="en-US" sz="3600" dirty="0">
+                <a:solidFill>
+                  <a:srgbClr val="CD2626"/>
+                </a:solidFill>
+              </a:endParaRPr>
+            </a:p>
+          </p:txBody>
+        </p:sp>
+        <p:sp>
+          <p:nvSpPr>
+            <p:cNvPr id="29" name="TextBox 28">
+              <a:extLst>
+                <a:ext uri="{FF2B5EF4-FFF2-40B4-BE49-F238E27FC236}">
+                  <a16:creationId xmlns:a16="http://schemas.microsoft.com/office/drawing/2014/main" id="{6CCDEB7F-FE22-B44C-63C3-C79B2BFD02E2}"/>
+                </a:ext>
+              </a:extLst>
+            </p:cNvPr>
+            <p:cNvSpPr txBox="1"/>
+            <p:nvPr/>
+          </p:nvSpPr>
+          <p:spPr>
+            <a:xfrm>
+              <a:off x="11385121" y="26751956"/>
+              <a:ext cx="2394796" cy="769441"/>
+            </a:xfrm>
+            <a:prstGeom prst="rect">
+              <a:avLst/>
+            </a:prstGeom>
+            <a:noFill/>
+          </p:spPr>
+          <p:txBody>
+            <a:bodyPr wrap="square" rtlCol="0">
+              <a:spAutoFit/>
+            </a:bodyPr>
+            <a:lstStyle/>
+            <a:p>
+              <a:pPr algn="ctr"/>
+              <a:r>
+                <a:rPr lang="en-US" sz="4400" dirty="0"/>
+                <a:t>Time</a:t>
+              </a:r>
+              <a:endParaRPr lang="en-US" sz="5400" dirty="0"/>
+            </a:p>
+          </p:txBody>
+        </p:sp>
+        <p:grpSp>
+          <p:nvGrpSpPr>
+            <p:cNvPr id="51" name="Group 50">
+              <a:extLst>
+                <a:ext uri="{FF2B5EF4-FFF2-40B4-BE49-F238E27FC236}">
+                  <a16:creationId xmlns:a16="http://schemas.microsoft.com/office/drawing/2014/main" id="{6EBD8620-1055-E3D7-324A-794CC1986EA4}"/>
+                </a:ext>
+              </a:extLst>
+            </p:cNvPr>
+            <p:cNvGrpSpPr/>
+            <p:nvPr/>
+          </p:nvGrpSpPr>
+          <p:grpSpPr>
+            <a:xfrm>
+              <a:off x="1181621" y="19942589"/>
+              <a:ext cx="21659306" cy="6872006"/>
+              <a:chOff x="2868183" y="17457166"/>
+              <a:chExt cx="20321051" cy="6238577"/>
+            </a:xfrm>
+          </p:grpSpPr>
+          <p:pic>
+            <p:nvPicPr>
+              <p:cNvPr id="49" name="Picture 48" descr="Chart&#10;&#10;Description automatically generated">
+                <a:extLst>
+                  <a:ext uri="{FF2B5EF4-FFF2-40B4-BE49-F238E27FC236}">
+                    <a16:creationId xmlns:a16="http://schemas.microsoft.com/office/drawing/2014/main" id="{88263C26-BCC9-3A07-91DF-EA57DA49FAED}"/>
+                  </a:ext>
+                </a:extLst>
+              </p:cNvPr>
+              <p:cNvPicPr>
+                <a:picLocks noChangeAspect="1"/>
+              </p:cNvPicPr>
+              <p:nvPr/>
+            </p:nvPicPr>
+            <p:blipFill rotWithShape="1">
+              <a:blip r:embed="rId7">
+                <a:extLst>
+                  <a:ext uri="{28A0092B-C50C-407E-A947-70E740481C1C}">
+                    <a14:useLocalDpi xmlns:a14="http://schemas.microsoft.com/office/drawing/2010/main" val="0"/>
+                  </a:ext>
+                </a:extLst>
+              </a:blip>
+              <a:srcRect r="94397"/>
+              <a:stretch/>
+            </p:blipFill>
+            <p:spPr>
+              <a:xfrm>
+                <a:off x="2868183" y="17457166"/>
+                <a:ext cx="1398256" cy="6238577"/>
+              </a:xfrm>
+              <a:prstGeom prst="rect">
+                <a:avLst/>
+              </a:prstGeom>
+            </p:spPr>
+          </p:pic>
+          <p:pic>
+            <p:nvPicPr>
+              <p:cNvPr id="50" name="Picture 49" descr="Chart&#10;&#10;Description automatically generated">
+                <a:extLst>
+                  <a:ext uri="{FF2B5EF4-FFF2-40B4-BE49-F238E27FC236}">
+                    <a16:creationId xmlns:a16="http://schemas.microsoft.com/office/drawing/2014/main" id="{4DF5DCD5-0452-1A59-58DF-6865355D9A24}"/>
+                  </a:ext>
+                </a:extLst>
+              </p:cNvPr>
+              <p:cNvPicPr>
+                <a:picLocks noChangeAspect="1"/>
+              </p:cNvPicPr>
+              <p:nvPr/>
+            </p:nvPicPr>
+            <p:blipFill rotWithShape="1">
+              <a:blip r:embed="rId7">
+                <a:extLst>
+                  <a:ext uri="{28A0092B-C50C-407E-A947-70E740481C1C}">
+                    <a14:useLocalDpi xmlns:a14="http://schemas.microsoft.com/office/drawing/2010/main" val="0"/>
+                  </a:ext>
+                </a:extLst>
+              </a:blip>
+              <a:srcRect l="15631" r="8257"/>
+              <a:stretch/>
+            </p:blipFill>
+            <p:spPr>
+              <a:xfrm>
+                <a:off x="4195950" y="17457166"/>
+                <a:ext cx="18993284" cy="6238577"/>
+              </a:xfrm>
+              <a:prstGeom prst="rect">
+                <a:avLst/>
+              </a:prstGeom>
+            </p:spPr>
+          </p:pic>
+        </p:grpSp>
+        <p:cxnSp>
+          <p:nvCxnSpPr>
+            <p:cNvPr id="22" name="Straight Connector 21">
+              <a:extLst>
+                <a:ext uri="{FF2B5EF4-FFF2-40B4-BE49-F238E27FC236}">
+                  <a16:creationId xmlns:a16="http://schemas.microsoft.com/office/drawing/2014/main" id="{BAE23B92-A9EC-B7F3-F3C2-DDC5D66953B9}"/>
+                </a:ext>
+              </a:extLst>
+            </p:cNvPr>
+            <p:cNvCxnSpPr>
+              <a:cxnSpLocks/>
+            </p:cNvCxnSpPr>
+            <p:nvPr/>
+          </p:nvCxnSpPr>
+          <p:spPr>
+            <a:xfrm>
+              <a:off x="22840927" y="19942589"/>
+              <a:ext cx="0" cy="6611257"/>
+            </a:xfrm>
+            <a:prstGeom prst="line">
+              <a:avLst/>
+            </a:prstGeom>
+            <a:ln w="38100">
+              <a:solidFill>
+                <a:srgbClr val="C00000"/>
+              </a:solidFill>
+            </a:ln>
+          </p:spPr>
+          <p:style>
+            <a:lnRef idx="1">
+              <a:schemeClr val="dk1"/>
+            </a:lnRef>
+            <a:fillRef idx="0">
+              <a:schemeClr val="dk1"/>
+            </a:fillRef>
+            <a:effectRef idx="0">
+              <a:schemeClr val="dk1"/>
+            </a:effectRef>
+            <a:fontRef idx="minor">
+              <a:schemeClr val="tx1"/>
+            </a:fontRef>
+          </p:style>
+        </p:cxnSp>
+        <p:cxnSp>
+          <p:nvCxnSpPr>
+            <p:cNvPr id="53" name="Straight Connector 52">
+              <a:extLst>
+                <a:ext uri="{FF2B5EF4-FFF2-40B4-BE49-F238E27FC236}">
+                  <a16:creationId xmlns:a16="http://schemas.microsoft.com/office/drawing/2014/main" id="{19E67042-1E55-80DE-5B02-D403DC209A04}"/>
+                </a:ext>
+              </a:extLst>
+            </p:cNvPr>
+            <p:cNvCxnSpPr>
+              <a:cxnSpLocks/>
+            </p:cNvCxnSpPr>
+            <p:nvPr/>
+          </p:nvCxnSpPr>
+          <p:spPr>
+            <a:xfrm>
+              <a:off x="3175316" y="26096634"/>
+              <a:ext cx="2343126" cy="0"/>
+            </a:xfrm>
+            <a:prstGeom prst="line">
+              <a:avLst/>
+            </a:prstGeom>
+            <a:ln w="76200">
+              <a:solidFill>
+                <a:srgbClr val="CD2626"/>
+              </a:solidFill>
+            </a:ln>
+          </p:spPr>
+          <p:style>
+            <a:lnRef idx="1">
+              <a:schemeClr val="accent1"/>
+            </a:lnRef>
+            <a:fillRef idx="0">
+              <a:schemeClr val="accent1"/>
+            </a:fillRef>
+            <a:effectRef idx="0">
+              <a:schemeClr val="accent1"/>
+            </a:effectRef>
+            <a:fontRef idx="minor">
+              <a:schemeClr val="tx1"/>
+            </a:fontRef>
+          </p:style>
+        </p:cxnSp>
+        <p:cxnSp>
+          <p:nvCxnSpPr>
+            <p:cNvPr id="54" name="Straight Connector 53">
+              <a:extLst>
+                <a:ext uri="{FF2B5EF4-FFF2-40B4-BE49-F238E27FC236}">
+                  <a16:creationId xmlns:a16="http://schemas.microsoft.com/office/drawing/2014/main" id="{F88F2714-6EF8-1DF8-8DAD-977161355B4B}"/>
+                </a:ext>
+              </a:extLst>
+            </p:cNvPr>
+            <p:cNvCxnSpPr>
+              <a:cxnSpLocks/>
+            </p:cNvCxnSpPr>
+            <p:nvPr/>
+          </p:nvCxnSpPr>
+          <p:spPr>
+            <a:xfrm flipV="1">
+              <a:off x="5518441" y="20717678"/>
+              <a:ext cx="8197559" cy="5378956"/>
+            </a:xfrm>
+            <a:prstGeom prst="line">
+              <a:avLst/>
+            </a:prstGeom>
+            <a:ln w="76200">
+              <a:solidFill>
+                <a:srgbClr val="CD2626"/>
+              </a:solidFill>
+            </a:ln>
+          </p:spPr>
+          <p:style>
+            <a:lnRef idx="1">
+              <a:schemeClr val="accent1"/>
+            </a:lnRef>
+            <a:fillRef idx="0">
+              <a:schemeClr val="accent1"/>
+            </a:fillRef>
+            <a:effectRef idx="0">
+              <a:schemeClr val="accent1"/>
+            </a:effectRef>
+            <a:fontRef idx="minor">
+              <a:schemeClr val="tx1"/>
+            </a:fontRef>
+          </p:style>
+        </p:cxnSp>
+        <p:cxnSp>
+          <p:nvCxnSpPr>
+            <p:cNvPr id="61" name="Straight Connector 60">
+              <a:extLst>
+                <a:ext uri="{FF2B5EF4-FFF2-40B4-BE49-F238E27FC236}">
+                  <a16:creationId xmlns:a16="http://schemas.microsoft.com/office/drawing/2014/main" id="{30275821-880B-D496-C1EA-2EDC2C20E88A}"/>
+                </a:ext>
+              </a:extLst>
+            </p:cNvPr>
+            <p:cNvCxnSpPr>
+              <a:cxnSpLocks/>
+            </p:cNvCxnSpPr>
+            <p:nvPr/>
+          </p:nvCxnSpPr>
+          <p:spPr>
+            <a:xfrm>
+              <a:off x="13716000" y="20717678"/>
+              <a:ext cx="1941648" cy="0"/>
+            </a:xfrm>
+            <a:prstGeom prst="line">
+              <a:avLst/>
+            </a:prstGeom>
+            <a:ln w="76200">
+              <a:solidFill>
+                <a:srgbClr val="CD2626"/>
+              </a:solidFill>
+            </a:ln>
+          </p:spPr>
+          <p:style>
+            <a:lnRef idx="1">
+              <a:schemeClr val="accent1"/>
+            </a:lnRef>
+            <a:fillRef idx="0">
+              <a:schemeClr val="accent1"/>
+            </a:fillRef>
+            <a:effectRef idx="0">
+              <a:schemeClr val="accent1"/>
+            </a:effectRef>
+            <a:fontRef idx="minor">
+              <a:schemeClr val="tx1"/>
+            </a:fontRef>
+          </p:style>
+        </p:cxnSp>
+        <p:cxnSp>
+          <p:nvCxnSpPr>
+            <p:cNvPr id="63" name="Straight Connector 62">
+              <a:extLst>
+                <a:ext uri="{FF2B5EF4-FFF2-40B4-BE49-F238E27FC236}">
+                  <a16:creationId xmlns:a16="http://schemas.microsoft.com/office/drawing/2014/main" id="{AD754C0A-0B94-A178-72D3-829D6216204F}"/>
+                </a:ext>
+              </a:extLst>
+            </p:cNvPr>
+            <p:cNvCxnSpPr>
+              <a:cxnSpLocks/>
+            </p:cNvCxnSpPr>
+            <p:nvPr/>
+          </p:nvCxnSpPr>
+          <p:spPr>
+            <a:xfrm>
+              <a:off x="15657648" y="20717678"/>
+              <a:ext cx="5666582" cy="5390988"/>
+            </a:xfrm>
+            <a:prstGeom prst="line">
+              <a:avLst/>
+            </a:prstGeom>
+            <a:ln w="76200">
+              <a:solidFill>
+                <a:srgbClr val="CD2626"/>
+              </a:solidFill>
+            </a:ln>
+          </p:spPr>
+          <p:style>
+            <a:lnRef idx="1">
+              <a:schemeClr val="accent1"/>
+            </a:lnRef>
+            <a:fillRef idx="0">
+              <a:schemeClr val="accent1"/>
+            </a:fillRef>
+            <a:effectRef idx="0">
+              <a:schemeClr val="accent1"/>
+            </a:effectRef>
+            <a:fontRef idx="minor">
+              <a:schemeClr val="tx1"/>
+            </a:fontRef>
+          </p:style>
+        </p:cxnSp>
+      </p:grpSp>
+      <p:sp>
+        <p:nvSpPr>
+          <p:cNvPr id="19" name="Arrow: Down 18">
+            <a:extLst>
+              <a:ext uri="{FF2B5EF4-FFF2-40B4-BE49-F238E27FC236}">
+                <a16:creationId xmlns:a16="http://schemas.microsoft.com/office/drawing/2014/main" id="{930B354D-9E7B-AACF-2FBD-C6828E6176CD}"/>
+              </a:ext>
+            </a:extLst>
+          </p:cNvPr>
+          <p:cNvSpPr/>
+          <p:nvPr/>
+        </p:nvSpPr>
+        <p:spPr>
+          <a:xfrm rot="9455432">
+            <a:off x="15091017" y="8933667"/>
+            <a:ext cx="183846" cy="303735"/>
+          </a:xfrm>
+          <a:prstGeom prst="downArrow">
+            <a:avLst/>
+          </a:prstGeom>
+          <a:solidFill>
+            <a:srgbClr val="C00000"/>
+          </a:solidFill>
+          <a:ln>
+            <a:solidFill>
+              <a:schemeClr val="tx1"/>
+            </a:solidFill>
+          </a:ln>
+          <a:effectLst>
+            <a:glow rad="228600">
+              <a:schemeClr val="accent6">
+                <a:satMod val="175000"/>
+                <a:alpha val="40000"/>
+              </a:schemeClr>
+            </a:glow>
+          </a:effectLst>
+        </p:spPr>
+        <p:style>
+          <a:lnRef idx="2">
+            <a:schemeClr val="accent1">
+              <a:shade val="50000"/>
+            </a:schemeClr>
+          </a:lnRef>
+          <a:fillRef idx="1">
+            <a:schemeClr val="accent1"/>
+          </a:fillRef>
+          <a:effectRef idx="0">
+            <a:schemeClr val="accent1"/>
+          </a:effectRef>
+          <a:fontRef idx="minor">
+            <a:schemeClr val="lt1"/>
+          </a:fontRef>
+        </p:style>
+        <p:txBody>
+          <a:bodyPr rtlCol="0" anchor="ctr"/>
+          <a:lstStyle/>
+          <a:p>
+            <a:pPr algn="ctr"/>
+            <a:endParaRPr lang="en-US" sz="2800">
+              <a:solidFill>
+                <a:srgbClr val="FF0000"/>
+              </a:solidFill>
+            </a:endParaRPr>
+          </a:p>
+        </p:txBody>
+      </p:sp>
+      <p:sp>
+        <p:nvSpPr>
+          <p:cNvPr id="20" name="Arrow: Down 19">
+            <a:extLst>
+              <a:ext uri="{FF2B5EF4-FFF2-40B4-BE49-F238E27FC236}">
+                <a16:creationId xmlns:a16="http://schemas.microsoft.com/office/drawing/2014/main" id="{74E24167-5129-3C6C-8648-6553E18B216A}"/>
+              </a:ext>
+            </a:extLst>
+          </p:cNvPr>
+          <p:cNvSpPr/>
+          <p:nvPr/>
+        </p:nvSpPr>
+        <p:spPr>
+          <a:xfrm rot="10800000">
+            <a:off x="15731921" y="8625937"/>
+            <a:ext cx="183846" cy="303734"/>
+          </a:xfrm>
+          <a:prstGeom prst="downArrow">
+            <a:avLst/>
+          </a:prstGeom>
+          <a:solidFill>
+            <a:srgbClr val="C00000"/>
+          </a:solidFill>
+          <a:ln>
+            <a:solidFill>
+              <a:schemeClr val="tx1"/>
+            </a:solidFill>
+          </a:ln>
+          <a:effectLst>
+            <a:glow rad="228600">
+              <a:schemeClr val="accent6">
+                <a:satMod val="175000"/>
+                <a:alpha val="40000"/>
+              </a:schemeClr>
+            </a:glow>
+          </a:effectLst>
+        </p:spPr>
+        <p:style>
+          <a:lnRef idx="2">
+            <a:schemeClr val="accent1">
+              <a:shade val="50000"/>
+            </a:schemeClr>
+          </a:lnRef>
+          <a:fillRef idx="1">
+            <a:schemeClr val="accent1"/>
+          </a:fillRef>
+          <a:effectRef idx="0">
+            <a:schemeClr val="accent1"/>
+          </a:effectRef>
+          <a:fontRef idx="minor">
+            <a:schemeClr val="lt1"/>
+          </a:fontRef>
+        </p:style>
+        <p:txBody>
+          <a:bodyPr rtlCol="0" anchor="ctr"/>
+          <a:lstStyle/>
+          <a:p>
+            <a:pPr algn="ctr"/>
+            <a:endParaRPr lang="en-US" sz="2800">
+              <a:solidFill>
+                <a:srgbClr val="FF0000"/>
+              </a:solidFill>
+            </a:endParaRPr>
+          </a:p>
+        </p:txBody>
+      </p:sp>
+      <p:sp>
+        <p:nvSpPr>
+          <p:cNvPr id="23" name="Arrow: Down 22">
+            <a:extLst>
+              <a:ext uri="{FF2B5EF4-FFF2-40B4-BE49-F238E27FC236}">
+                <a16:creationId xmlns:a16="http://schemas.microsoft.com/office/drawing/2014/main" id="{DDC04FBE-5C37-2209-657E-1AC166FD9258}"/>
+              </a:ext>
+            </a:extLst>
+          </p:cNvPr>
+          <p:cNvSpPr/>
+          <p:nvPr/>
+        </p:nvSpPr>
+        <p:spPr>
+          <a:xfrm rot="10800000">
+            <a:off x="16565697" y="8625343"/>
+            <a:ext cx="183846" cy="303734"/>
+          </a:xfrm>
+          <a:prstGeom prst="downArrow">
+            <a:avLst/>
+          </a:prstGeom>
+          <a:solidFill>
+            <a:srgbClr val="C00000"/>
+          </a:solidFill>
+          <a:ln>
+            <a:solidFill>
+              <a:schemeClr val="tx1"/>
+            </a:solidFill>
+          </a:ln>
+          <a:effectLst>
+            <a:glow rad="228600">
+              <a:schemeClr val="accent6">
+                <a:satMod val="175000"/>
+                <a:alpha val="40000"/>
+              </a:schemeClr>
+            </a:glow>
+          </a:effectLst>
+        </p:spPr>
+        <p:style>
+          <a:lnRef idx="2">
+            <a:schemeClr val="accent1">
+              <a:shade val="50000"/>
+            </a:schemeClr>
+          </a:lnRef>
+          <a:fillRef idx="1">
+            <a:schemeClr val="accent1"/>
+          </a:fillRef>
+          <a:effectRef idx="0">
+            <a:schemeClr val="accent1"/>
+          </a:effectRef>
+          <a:fontRef idx="minor">
+            <a:schemeClr val="lt1"/>
+          </a:fontRef>
+        </p:style>
+        <p:txBody>
+          <a:bodyPr rtlCol="0" anchor="ctr"/>
+          <a:lstStyle/>
+          <a:p>
+            <a:pPr algn="ctr"/>
+            <a:endParaRPr lang="en-US" sz="2800">
+              <a:solidFill>
+                <a:srgbClr val="FF0000"/>
+              </a:solidFill>
+            </a:endParaRPr>
+          </a:p>
+        </p:txBody>
+      </p:sp>
+      <p:sp>
+        <p:nvSpPr>
+          <p:cNvPr id="26" name="Arrow: Down 25">
+            <a:extLst>
+              <a:ext uri="{FF2B5EF4-FFF2-40B4-BE49-F238E27FC236}">
+                <a16:creationId xmlns:a16="http://schemas.microsoft.com/office/drawing/2014/main" id="{5ADD8C37-9947-119E-CB88-7401139D805F}"/>
+              </a:ext>
+            </a:extLst>
+          </p:cNvPr>
+          <p:cNvSpPr/>
+          <p:nvPr/>
+        </p:nvSpPr>
+        <p:spPr>
+          <a:xfrm rot="12103310">
+            <a:off x="17245598" y="8870013"/>
+            <a:ext cx="183846" cy="303734"/>
+          </a:xfrm>
+          <a:prstGeom prst="downArrow">
+            <a:avLst/>
+          </a:prstGeom>
+          <a:solidFill>
+            <a:srgbClr val="C00000"/>
+          </a:solidFill>
+          <a:ln>
+            <a:solidFill>
+              <a:schemeClr val="tx1"/>
+            </a:solidFill>
+          </a:ln>
+          <a:effectLst>
+            <a:glow rad="228600">
+              <a:schemeClr val="accent6">
+                <a:satMod val="175000"/>
+                <a:alpha val="40000"/>
+              </a:schemeClr>
+            </a:glow>
+          </a:effectLst>
+        </p:spPr>
+        <p:style>
+          <a:lnRef idx="2">
+            <a:schemeClr val="accent1">
+              <a:shade val="50000"/>
+            </a:schemeClr>
+          </a:lnRef>
+          <a:fillRef idx="1">
+            <a:schemeClr val="accent1"/>
+          </a:fillRef>
+          <a:effectRef idx="0">
+            <a:schemeClr val="accent1"/>
+          </a:effectRef>
+          <a:fontRef idx="minor">
+            <a:schemeClr val="lt1"/>
+          </a:fontRef>
+        </p:style>
+        <p:txBody>
+          <a:bodyPr rtlCol="0" anchor="ctr"/>
+          <a:lstStyle/>
+          <a:p>
+            <a:pPr algn="ctr"/>
+            <a:endParaRPr lang="en-US" sz="2800">
+              <a:solidFill>
+                <a:srgbClr val="FF0000"/>
+              </a:solidFill>
+            </a:endParaRPr>
+          </a:p>
+        </p:txBody>
+      </p:sp>
+      <p:sp>
+        <p:nvSpPr>
+          <p:cNvPr id="52" name="Arrow: Down 51">
+            <a:extLst>
+              <a:ext uri="{FF2B5EF4-FFF2-40B4-BE49-F238E27FC236}">
+                <a16:creationId xmlns:a16="http://schemas.microsoft.com/office/drawing/2014/main" id="{F1C22E97-04AB-241E-39A7-F333B21CD10E}"/>
+              </a:ext>
+            </a:extLst>
+          </p:cNvPr>
+          <p:cNvSpPr/>
+          <p:nvPr/>
+        </p:nvSpPr>
+        <p:spPr>
+          <a:xfrm rot="10800000" flipH="1">
+            <a:off x="15858982" y="6290747"/>
+            <a:ext cx="706714" cy="1326728"/>
+          </a:xfrm>
+          <a:prstGeom prst="downArrow">
+            <a:avLst/>
+          </a:prstGeom>
+          <a:solidFill>
+            <a:srgbClr val="C00000"/>
+          </a:solidFill>
+          <a:ln>
+            <a:solidFill>
+              <a:schemeClr val="tx1"/>
+            </a:solidFill>
+          </a:ln>
+        </p:spPr>
+        <p:style>
+          <a:lnRef idx="2">
+            <a:schemeClr val="accent1">
+              <a:shade val="50000"/>
+            </a:schemeClr>
+          </a:lnRef>
+          <a:fillRef idx="1">
+            <a:schemeClr val="accent1"/>
+          </a:fillRef>
+          <a:effectRef idx="0">
+            <a:schemeClr val="accent1"/>
+          </a:effectRef>
+          <a:fontRef idx="minor">
+            <a:schemeClr val="lt1"/>
+          </a:fontRef>
+        </p:style>
+        <p:txBody>
+          <a:bodyPr rtlCol="0" anchor="ctr"/>
+          <a:lstStyle/>
+          <a:p>
+            <a:pPr algn="ctr"/>
+            <a:endParaRPr lang="en-US" sz="2800">
+              <a:solidFill>
+                <a:srgbClr val="FF0000"/>
+              </a:solidFill>
+            </a:endParaRPr>
+          </a:p>
+        </p:txBody>
+      </p:sp>
+      <p:sp>
+        <p:nvSpPr>
+          <p:cNvPr id="55" name="Arrow: Down 54">
+            <a:extLst>
+              <a:ext uri="{FF2B5EF4-FFF2-40B4-BE49-F238E27FC236}">
+                <a16:creationId xmlns:a16="http://schemas.microsoft.com/office/drawing/2014/main" id="{8AD619CB-61EC-5687-BED9-458A9DA4AE43}"/>
+              </a:ext>
+            </a:extLst>
+          </p:cNvPr>
+          <p:cNvSpPr/>
+          <p:nvPr/>
+        </p:nvSpPr>
+        <p:spPr>
+          <a:xfrm rot="8170142" flipH="1">
+            <a:off x="20858217" y="5441818"/>
+            <a:ext cx="529357" cy="993773"/>
+          </a:xfrm>
+          <a:prstGeom prst="downArrow">
+            <a:avLst/>
+          </a:prstGeom>
+          <a:solidFill>
+            <a:srgbClr val="C00000"/>
+          </a:solidFill>
+          <a:ln>
+            <a:solidFill>
+              <a:schemeClr val="tx1"/>
+            </a:solidFill>
+          </a:ln>
+        </p:spPr>
+        <p:style>
+          <a:lnRef idx="2">
+            <a:schemeClr val="accent1">
+              <a:shade val="50000"/>
+            </a:schemeClr>
+          </a:lnRef>
+          <a:fillRef idx="1">
+            <a:schemeClr val="accent1"/>
+          </a:fillRef>
+          <a:effectRef idx="0">
+            <a:schemeClr val="accent1"/>
+          </a:effectRef>
+          <a:fontRef idx="minor">
+            <a:schemeClr val="lt1"/>
+          </a:fontRef>
+        </p:style>
+        <p:txBody>
+          <a:bodyPr rtlCol="0" anchor="ctr"/>
+          <a:lstStyle/>
+          <a:p>
+            <a:pPr algn="ctr"/>
+            <a:endParaRPr lang="en-US" sz="2800">
+              <a:solidFill>
+                <a:srgbClr val="FF0000"/>
+              </a:solidFill>
+            </a:endParaRPr>
+          </a:p>
+        </p:txBody>
+      </p:sp>
+      <p:sp>
+        <p:nvSpPr>
+          <p:cNvPr id="56" name="Arrow: Down 55">
+            <a:extLst>
+              <a:ext uri="{FF2B5EF4-FFF2-40B4-BE49-F238E27FC236}">
+                <a16:creationId xmlns:a16="http://schemas.microsoft.com/office/drawing/2014/main" id="{A0E5B703-2BB7-3584-68AD-B1B92018D076}"/>
+              </a:ext>
+            </a:extLst>
+          </p:cNvPr>
+          <p:cNvSpPr/>
+          <p:nvPr/>
+        </p:nvSpPr>
+        <p:spPr>
+          <a:xfrm rot="10800000" flipH="1">
+            <a:off x="2711040" y="6453250"/>
+            <a:ext cx="373046" cy="700327"/>
+          </a:xfrm>
+          <a:prstGeom prst="downArrow">
+            <a:avLst/>
+          </a:prstGeom>
+          <a:noFill/>
+          <a:ln>
+            <a:solidFill>
+              <a:schemeClr val="tx1"/>
+            </a:solidFill>
+          </a:ln>
+        </p:spPr>
+        <p:style>
+          <a:lnRef idx="2">
+            <a:schemeClr val="accent1">
+              <a:shade val="50000"/>
+            </a:schemeClr>
+          </a:lnRef>
+          <a:fillRef idx="1">
+            <a:schemeClr val="accent1"/>
+          </a:fillRef>
+          <a:effectRef idx="0">
+            <a:schemeClr val="accent1"/>
+          </a:effectRef>
+          <a:fontRef idx="minor">
+            <a:schemeClr val="lt1"/>
+          </a:fontRef>
+        </p:style>
+        <p:txBody>
+          <a:bodyPr rtlCol="0" anchor="ctr"/>
+          <a:lstStyle/>
+          <a:p>
+            <a:pPr algn="ctr"/>
+            <a:endParaRPr lang="en-US" sz="2800">
+              <a:solidFill>
+                <a:srgbClr val="FF0000"/>
+              </a:solidFill>
+            </a:endParaRPr>
+          </a:p>
+        </p:txBody>
+      </p:sp>
+      <p:sp>
+        <p:nvSpPr>
+          <p:cNvPr id="60" name="Arrow: Curved Right 59">
+            <a:extLst>
+              <a:ext uri="{FF2B5EF4-FFF2-40B4-BE49-F238E27FC236}">
+                <a16:creationId xmlns:a16="http://schemas.microsoft.com/office/drawing/2014/main" id="{11D92E2C-9A68-6600-C5EE-255C1342971F}"/>
+              </a:ext>
+            </a:extLst>
+          </p:cNvPr>
+          <p:cNvSpPr/>
+          <p:nvPr/>
+        </p:nvSpPr>
+        <p:spPr>
+          <a:xfrm>
+            <a:off x="12970250" y="5359699"/>
+            <a:ext cx="1491499" cy="3952354"/>
+          </a:xfrm>
+          <a:prstGeom prst="curvedRightArrow">
+            <a:avLst/>
+          </a:prstGeom>
+          <a:solidFill>
+            <a:schemeClr val="bg1"/>
+          </a:solidFill>
+          <a:ln>
+            <a:solidFill>
+              <a:srgbClr val="CD2626"/>
+            </a:solidFill>
+          </a:ln>
+        </p:spPr>
+        <p:style>
+          <a:lnRef idx="2">
+            <a:schemeClr val="accent1">
+              <a:shade val="50000"/>
+            </a:schemeClr>
+          </a:lnRef>
+          <a:fillRef idx="1">
+            <a:schemeClr val="accent1"/>
+          </a:fillRef>
+          <a:effectRef idx="0">
+            <a:schemeClr val="accent1"/>
+          </a:effectRef>
+          <a:fontRef idx="minor">
+            <a:schemeClr val="lt1"/>
+          </a:fontRef>
+        </p:style>
+        <p:txBody>
+          <a:bodyPr rtlCol="0" anchor="ctr"/>
+          <a:lstStyle/>
+          <a:p>
+            <a:pPr algn="ctr"/>
+            <a:endParaRPr lang="en-US" dirty="0">
+              <a:solidFill>
+                <a:schemeClr val="tx1"/>
+              </a:solidFill>
+            </a:endParaRPr>
+          </a:p>
+        </p:txBody>
+      </p:sp>
+      <p:sp>
+        <p:nvSpPr>
+          <p:cNvPr id="160" name="Arrow: Curved Right 159">
+            <a:extLst>
+              <a:ext uri="{FF2B5EF4-FFF2-40B4-BE49-F238E27FC236}">
+                <a16:creationId xmlns:a16="http://schemas.microsoft.com/office/drawing/2014/main" id="{F5C7449B-47A9-8431-217F-6C4F0EF84D9A}"/>
+              </a:ext>
+            </a:extLst>
+          </p:cNvPr>
+          <p:cNvSpPr/>
+          <p:nvPr/>
+        </p:nvSpPr>
+        <p:spPr>
+          <a:xfrm rot="19127516">
+            <a:off x="18120437" y="5662007"/>
+            <a:ext cx="1491499" cy="3952354"/>
+          </a:xfrm>
+          <a:prstGeom prst="curvedRightArrow">
+            <a:avLst/>
+          </a:prstGeom>
+          <a:solidFill>
+            <a:schemeClr val="bg1"/>
+          </a:solidFill>
+          <a:ln>
+            <a:solidFill>
+              <a:srgbClr val="CD2626"/>
+            </a:solidFill>
+          </a:ln>
+        </p:spPr>
+        <p:style>
+          <a:lnRef idx="2">
+            <a:schemeClr val="accent1">
+              <a:shade val="50000"/>
+            </a:schemeClr>
+          </a:lnRef>
+          <a:fillRef idx="1">
+            <a:schemeClr val="accent1"/>
+          </a:fillRef>
+          <a:effectRef idx="0">
+            <a:schemeClr val="accent1"/>
+          </a:effectRef>
+          <a:fontRef idx="minor">
+            <a:schemeClr val="lt1"/>
+          </a:fontRef>
+        </p:style>
+        <p:txBody>
+          <a:bodyPr rtlCol="0" anchor="ctr"/>
+          <a:lstStyle/>
+          <a:p>
+            <a:pPr algn="ctr"/>
+            <a:endParaRPr lang="en-US" dirty="0">
+              <a:solidFill>
+                <a:schemeClr val="tx1"/>
+              </a:solidFill>
+            </a:endParaRPr>
+          </a:p>
+        </p:txBody>
+      </p:sp>
       <p:cxnSp>
         <p:nvCxnSpPr>
-          <p:cNvPr id="53" name="Straight Connector 52">
+          <p:cNvPr id="162" name="Straight Connector 161">
             <a:extLst>
               <a:ext uri="{FF2B5EF4-FFF2-40B4-BE49-F238E27FC236}">
-                <a16:creationId xmlns:a16="http://schemas.microsoft.com/office/drawing/2014/main" id="{19E67042-1E55-80DE-5B02-D403DC209A04}"/>
+                <a16:creationId xmlns:a16="http://schemas.microsoft.com/office/drawing/2014/main" id="{18FC2C1E-1543-759E-84B6-C3EABF1DF101}"/>
               </a:ext>
             </a:extLst>
           </p:cNvPr>
@@ -5667,17 +5919,18 @@
           <p:nvPr/>
         </p:nvCxnSpPr>
         <p:spPr>
-          <a:xfrm>
-            <a:off x="739935" y="16536870"/>
-            <a:ext cx="4889402" cy="0"/>
+          <a:xfrm flipH="1">
+            <a:off x="5893579" y="0"/>
+            <a:ext cx="113383" cy="21215720"/>
           </a:xfrm>
           <a:prstGeom prst="line">
             <a:avLst/>
           </a:prstGeom>
           <a:ln w="76200">
             <a:solidFill>
-              <a:srgbClr val="CD2626"/>
+              <a:srgbClr val="C00000"/>
             </a:solidFill>
+            <a:prstDash val="dash"/>
           </a:ln>
         </p:spPr>
         <p:style>
@@ -5695,268 +5948,6 @@
           </a:fontRef>
         </p:style>
       </p:cxnSp>
-      <p:cxnSp>
-        <p:nvCxnSpPr>
-          <p:cNvPr id="54" name="Straight Connector 53">
-            <a:extLst>
-              <a:ext uri="{FF2B5EF4-FFF2-40B4-BE49-F238E27FC236}">
-                <a16:creationId xmlns:a16="http://schemas.microsoft.com/office/drawing/2014/main" id="{F88F2714-6EF8-1DF8-8DAD-977161355B4B}"/>
-              </a:ext>
-            </a:extLst>
-          </p:cNvPr>
-          <p:cNvCxnSpPr>
-            <a:cxnSpLocks/>
-          </p:cNvCxnSpPr>
-          <p:nvPr/>
-        </p:nvCxnSpPr>
-        <p:spPr>
-          <a:xfrm flipV="1">
-            <a:off x="5577166" y="13846915"/>
-            <a:ext cx="7762484" cy="2701987"/>
-          </a:xfrm>
-          <a:prstGeom prst="line">
-            <a:avLst/>
-          </a:prstGeom>
-          <a:ln w="76200">
-            <a:solidFill>
-              <a:srgbClr val="CD2626"/>
-            </a:solidFill>
-          </a:ln>
-        </p:spPr>
-        <p:style>
-          <a:lnRef idx="1">
-            <a:schemeClr val="accent1"/>
-          </a:lnRef>
-          <a:fillRef idx="0">
-            <a:schemeClr val="accent1"/>
-          </a:fillRef>
-          <a:effectRef idx="0">
-            <a:schemeClr val="accent1"/>
-          </a:effectRef>
-          <a:fontRef idx="minor">
-            <a:schemeClr val="tx1"/>
-          </a:fontRef>
-        </p:style>
-      </p:cxnSp>
-      <p:cxnSp>
-        <p:nvCxnSpPr>
-          <p:cNvPr id="61" name="Straight Connector 60">
-            <a:extLst>
-              <a:ext uri="{FF2B5EF4-FFF2-40B4-BE49-F238E27FC236}">
-                <a16:creationId xmlns:a16="http://schemas.microsoft.com/office/drawing/2014/main" id="{30275821-880B-D496-C1EA-2EDC2C20E88A}"/>
-              </a:ext>
-            </a:extLst>
-          </p:cNvPr>
-          <p:cNvCxnSpPr>
-            <a:cxnSpLocks/>
-          </p:cNvCxnSpPr>
-          <p:nvPr/>
-        </p:nvCxnSpPr>
-        <p:spPr>
-          <a:xfrm flipV="1">
-            <a:off x="13291453" y="13850324"/>
-            <a:ext cx="3311733" cy="3120"/>
-          </a:xfrm>
-          <a:prstGeom prst="line">
-            <a:avLst/>
-          </a:prstGeom>
-          <a:ln w="76200">
-            <a:solidFill>
-              <a:srgbClr val="CD2626"/>
-            </a:solidFill>
-          </a:ln>
-        </p:spPr>
-        <p:style>
-          <a:lnRef idx="1">
-            <a:schemeClr val="accent1"/>
-          </a:lnRef>
-          <a:fillRef idx="0">
-            <a:schemeClr val="accent1"/>
-          </a:fillRef>
-          <a:effectRef idx="0">
-            <a:schemeClr val="accent1"/>
-          </a:effectRef>
-          <a:fontRef idx="minor">
-            <a:schemeClr val="tx1"/>
-          </a:fontRef>
-        </p:style>
-      </p:cxnSp>
-      <p:cxnSp>
-        <p:nvCxnSpPr>
-          <p:cNvPr id="63" name="Straight Connector 62">
-            <a:extLst>
-              <a:ext uri="{FF2B5EF4-FFF2-40B4-BE49-F238E27FC236}">
-                <a16:creationId xmlns:a16="http://schemas.microsoft.com/office/drawing/2014/main" id="{AD754C0A-0B94-A178-72D3-829D6216204F}"/>
-              </a:ext>
-            </a:extLst>
-          </p:cNvPr>
-          <p:cNvCxnSpPr>
-            <a:cxnSpLocks/>
-          </p:cNvCxnSpPr>
-          <p:nvPr/>
-        </p:nvCxnSpPr>
-        <p:spPr>
-          <a:xfrm>
-            <a:off x="16591154" y="13829380"/>
-            <a:ext cx="3534358" cy="2719522"/>
-          </a:xfrm>
-          <a:prstGeom prst="line">
-            <a:avLst/>
-          </a:prstGeom>
-          <a:ln w="76200">
-            <a:solidFill>
-              <a:srgbClr val="CD2626"/>
-            </a:solidFill>
-          </a:ln>
-        </p:spPr>
-        <p:style>
-          <a:lnRef idx="1">
-            <a:schemeClr val="accent1"/>
-          </a:lnRef>
-          <a:fillRef idx="0">
-            <a:schemeClr val="accent1"/>
-          </a:fillRef>
-          <a:effectRef idx="0">
-            <a:schemeClr val="accent1"/>
-          </a:effectRef>
-          <a:fontRef idx="minor">
-            <a:schemeClr val="tx1"/>
-          </a:fontRef>
-        </p:style>
-      </p:cxnSp>
-      <p:cxnSp>
-        <p:nvCxnSpPr>
-          <p:cNvPr id="161" name="Straight Connector 160">
-            <a:extLst>
-              <a:ext uri="{FF2B5EF4-FFF2-40B4-BE49-F238E27FC236}">
-                <a16:creationId xmlns:a16="http://schemas.microsoft.com/office/drawing/2014/main" id="{4FAC82A5-9FAD-A138-D37A-CDA816A5D727}"/>
-              </a:ext>
-            </a:extLst>
-          </p:cNvPr>
-          <p:cNvCxnSpPr>
-            <a:cxnSpLocks/>
-          </p:cNvCxnSpPr>
-          <p:nvPr/>
-        </p:nvCxnSpPr>
-        <p:spPr>
-          <a:xfrm>
-            <a:off x="20099047" y="16548902"/>
-            <a:ext cx="4889402" cy="0"/>
-          </a:xfrm>
-          <a:prstGeom prst="line">
-            <a:avLst/>
-          </a:prstGeom>
-          <a:ln w="76200">
-            <a:solidFill>
-              <a:srgbClr val="CD2626"/>
-            </a:solidFill>
-          </a:ln>
-        </p:spPr>
-        <p:style>
-          <a:lnRef idx="1">
-            <a:schemeClr val="accent1"/>
-          </a:lnRef>
-          <a:fillRef idx="0">
-            <a:schemeClr val="accent1"/>
-          </a:fillRef>
-          <a:effectRef idx="0">
-            <a:schemeClr val="accent1"/>
-          </a:effectRef>
-          <a:fontRef idx="minor">
-            <a:schemeClr val="tx1"/>
-          </a:fontRef>
-        </p:style>
-      </p:cxnSp>
-      <p:sp>
-        <p:nvSpPr>
-          <p:cNvPr id="164" name="TextBox 163">
-            <a:extLst>
-              <a:ext uri="{FF2B5EF4-FFF2-40B4-BE49-F238E27FC236}">
-                <a16:creationId xmlns:a16="http://schemas.microsoft.com/office/drawing/2014/main" id="{C0557C6E-F7BF-BEF0-55B1-14CAB1B73A97}"/>
-              </a:ext>
-            </a:extLst>
-          </p:cNvPr>
-          <p:cNvSpPr txBox="1"/>
-          <p:nvPr/>
-        </p:nvSpPr>
-        <p:spPr>
-          <a:xfrm>
-            <a:off x="14158824" y="3835913"/>
-            <a:ext cx="4092104" cy="584775"/>
-          </a:xfrm>
-          <a:prstGeom prst="rect">
-            <a:avLst/>
-          </a:prstGeom>
-          <a:noFill/>
-        </p:spPr>
-        <p:txBody>
-          <a:bodyPr wrap="square" rtlCol="0">
-            <a:spAutoFit/>
-          </a:bodyPr>
-          <a:lstStyle/>
-          <a:p>
-            <a:pPr algn="ctr"/>
-            <a:r>
-              <a:rPr lang="en-US" sz="3200" b="1" dirty="0" err="1">
-                <a:solidFill>
-                  <a:srgbClr val="C00000"/>
-                </a:solidFill>
-              </a:rPr>
-              <a:t>Microbialized</a:t>
-            </a:r>
-            <a:endParaRPr lang="en-US" sz="3600" b="1" dirty="0">
-              <a:solidFill>
-                <a:srgbClr val="C00000"/>
-              </a:solidFill>
-            </a:endParaRPr>
-          </a:p>
-        </p:txBody>
-      </p:sp>
-      <p:sp>
-        <p:nvSpPr>
-          <p:cNvPr id="165" name="TextBox 164">
-            <a:extLst>
-              <a:ext uri="{FF2B5EF4-FFF2-40B4-BE49-F238E27FC236}">
-                <a16:creationId xmlns:a16="http://schemas.microsoft.com/office/drawing/2014/main" id="{6D978531-C4BF-C349-04E5-333E988295C6}"/>
-              </a:ext>
-            </a:extLst>
-          </p:cNvPr>
-          <p:cNvSpPr txBox="1"/>
-          <p:nvPr/>
-        </p:nvSpPr>
-        <p:spPr>
-          <a:xfrm>
-            <a:off x="20944906" y="3502482"/>
-            <a:ext cx="4092104" cy="584775"/>
-          </a:xfrm>
-          <a:prstGeom prst="rect">
-            <a:avLst/>
-          </a:prstGeom>
-          <a:noFill/>
-        </p:spPr>
-        <p:txBody>
-          <a:bodyPr wrap="square" rtlCol="0">
-            <a:spAutoFit/>
-          </a:bodyPr>
-          <a:lstStyle/>
-          <a:p>
-            <a:pPr algn="ctr"/>
-            <a:r>
-              <a:rPr lang="en-US" sz="3200" b="1" dirty="0" err="1">
-                <a:solidFill>
-                  <a:srgbClr val="C00000"/>
-                </a:solidFill>
-              </a:rPr>
-              <a:t>Microbialized</a:t>
-            </a:r>
-            <a:endParaRPr lang="en-US" sz="3600" b="1" dirty="0">
-              <a:solidFill>
-                <a:srgbClr val="C00000"/>
-              </a:solidFill>
-            </a:endParaRPr>
-          </a:p>
-        </p:txBody>
-      </p:sp>
     </p:spTree>
     <p:extLst>
       <p:ext uri="{BB962C8B-B14F-4D97-AF65-F5344CB8AC3E}">

</xml_diff>

<commit_message>
Updated figures and associated code. Added new Figures PDF "Figures - Sparagon and Arts et al.  15_Feb_2023.pdf"
</commit_message>
<xml_diff>
--- a/figures/Synthesis Figure.pptx
+++ b/figures/Synthesis Figure.pptx
@@ -271,7 +271,7 @@
           <a:p>
             <a:fld id="{FE17BAA6-2BAA-4FAA-BBCC-9D33CF1DE795}" type="datetimeFigureOut">
               <a:rPr lang="en-US" smtClean="0"/>
-              <a:t>2/14/2023</a:t>
+              <a:t>2/15/2023</a:t>
             </a:fld>
             <a:endParaRPr lang="en-US"/>
           </a:p>
@@ -441,7 +441,7 @@
           <a:p>
             <a:fld id="{FE17BAA6-2BAA-4FAA-BBCC-9D33CF1DE795}" type="datetimeFigureOut">
               <a:rPr lang="en-US" smtClean="0"/>
-              <a:t>2/14/2023</a:t>
+              <a:t>2/15/2023</a:t>
             </a:fld>
             <a:endParaRPr lang="en-US"/>
           </a:p>
@@ -621,7 +621,7 @@
           <a:p>
             <a:fld id="{FE17BAA6-2BAA-4FAA-BBCC-9D33CF1DE795}" type="datetimeFigureOut">
               <a:rPr lang="en-US" smtClean="0"/>
-              <a:t>2/14/2023</a:t>
+              <a:t>2/15/2023</a:t>
             </a:fld>
             <a:endParaRPr lang="en-US"/>
           </a:p>
@@ -791,7 +791,7 @@
           <a:p>
             <a:fld id="{FE17BAA6-2BAA-4FAA-BBCC-9D33CF1DE795}" type="datetimeFigureOut">
               <a:rPr lang="en-US" smtClean="0"/>
-              <a:t>2/14/2023</a:t>
+              <a:t>2/15/2023</a:t>
             </a:fld>
             <a:endParaRPr lang="en-US"/>
           </a:p>
@@ -1035,7 +1035,7 @@
           <a:p>
             <a:fld id="{FE17BAA6-2BAA-4FAA-BBCC-9D33CF1DE795}" type="datetimeFigureOut">
               <a:rPr lang="en-US" smtClean="0"/>
-              <a:t>2/14/2023</a:t>
+              <a:t>2/15/2023</a:t>
             </a:fld>
             <a:endParaRPr lang="en-US"/>
           </a:p>
@@ -1267,7 +1267,7 @@
           <a:p>
             <a:fld id="{FE17BAA6-2BAA-4FAA-BBCC-9D33CF1DE795}" type="datetimeFigureOut">
               <a:rPr lang="en-US" smtClean="0"/>
-              <a:t>2/14/2023</a:t>
+              <a:t>2/15/2023</a:t>
             </a:fld>
             <a:endParaRPr lang="en-US"/>
           </a:p>
@@ -1634,7 +1634,7 @@
           <a:p>
             <a:fld id="{FE17BAA6-2BAA-4FAA-BBCC-9D33CF1DE795}" type="datetimeFigureOut">
               <a:rPr lang="en-US" smtClean="0"/>
-              <a:t>2/14/2023</a:t>
+              <a:t>2/15/2023</a:t>
             </a:fld>
             <a:endParaRPr lang="en-US"/>
           </a:p>
@@ -1752,7 +1752,7 @@
           <a:p>
             <a:fld id="{FE17BAA6-2BAA-4FAA-BBCC-9D33CF1DE795}" type="datetimeFigureOut">
               <a:rPr lang="en-US" smtClean="0"/>
-              <a:t>2/14/2023</a:t>
+              <a:t>2/15/2023</a:t>
             </a:fld>
             <a:endParaRPr lang="en-US"/>
           </a:p>
@@ -1847,7 +1847,7 @@
           <a:p>
             <a:fld id="{FE17BAA6-2BAA-4FAA-BBCC-9D33CF1DE795}" type="datetimeFigureOut">
               <a:rPr lang="en-US" smtClean="0"/>
-              <a:t>2/14/2023</a:t>
+              <a:t>2/15/2023</a:t>
             </a:fld>
             <a:endParaRPr lang="en-US"/>
           </a:p>
@@ -2124,7 +2124,7 @@
           <a:p>
             <a:fld id="{FE17BAA6-2BAA-4FAA-BBCC-9D33CF1DE795}" type="datetimeFigureOut">
               <a:rPr lang="en-US" smtClean="0"/>
-              <a:t>2/14/2023</a:t>
+              <a:t>2/15/2023</a:t>
             </a:fld>
             <a:endParaRPr lang="en-US"/>
           </a:p>
@@ -2381,7 +2381,7 @@
           <a:p>
             <a:fld id="{FE17BAA6-2BAA-4FAA-BBCC-9D33CF1DE795}" type="datetimeFigureOut">
               <a:rPr lang="en-US" smtClean="0"/>
-              <a:t>2/14/2023</a:t>
+              <a:t>2/15/2023</a:t>
             </a:fld>
             <a:endParaRPr lang="en-US"/>
           </a:p>
@@ -2594,7 +2594,7 @@
           <a:p>
             <a:fld id="{FE17BAA6-2BAA-4FAA-BBCC-9D33CF1DE795}" type="datetimeFigureOut">
               <a:rPr lang="en-US" smtClean="0"/>
-              <a:t>2/14/2023</a:t>
+              <a:t>2/15/2023</a:t>
             </a:fld>
             <a:endParaRPr lang="en-US"/>
           </a:p>
@@ -4596,128 +4596,23 @@
         </p:nvSpPr>
         <p:spPr>
           <a:xfrm rot="16200000">
-            <a:off x="5874377" y="10453669"/>
-            <a:ext cx="713624" cy="1203703"/>
+            <a:off x="12761190" y="1187708"/>
+            <a:ext cx="374851" cy="24566230"/>
           </a:xfrm>
           <a:prstGeom prst="downArrow">
-            <a:avLst/>
+            <a:avLst>
+              <a:gd name="adj1" fmla="val 50000"/>
+              <a:gd name="adj2" fmla="val 510951"/>
+            </a:avLst>
           </a:prstGeom>
-          <a:noFill/>
+          <a:solidFill>
+            <a:schemeClr val="bg1">
+              <a:lumMod val="85000"/>
+            </a:schemeClr>
+          </a:solidFill>
           <a:ln>
             <a:solidFill>
               <a:schemeClr val="tx1"/>
-            </a:solidFill>
-          </a:ln>
-        </p:spPr>
-        <p:style>
-          <a:lnRef idx="2">
-            <a:schemeClr val="accent1">
-              <a:shade val="50000"/>
-            </a:schemeClr>
-          </a:lnRef>
-          <a:fillRef idx="1">
-            <a:schemeClr val="accent1"/>
-          </a:fillRef>
-          <a:effectRef idx="0">
-            <a:schemeClr val="accent1"/>
-          </a:effectRef>
-          <a:fontRef idx="minor">
-            <a:schemeClr val="lt1"/>
-          </a:fontRef>
-        </p:style>
-        <p:txBody>
-          <a:bodyPr rtlCol="0" anchor="ctr"/>
-          <a:lstStyle/>
-          <a:p>
-            <a:pPr algn="ctr"/>
-            <a:endParaRPr lang="en-US" sz="2800">
-              <a:solidFill>
-                <a:srgbClr val="FF0000"/>
-              </a:solidFill>
-            </a:endParaRPr>
-          </a:p>
-        </p:txBody>
-      </p:sp>
-      <p:sp>
-        <p:nvSpPr>
-          <p:cNvPr id="213" name="Arrow: Down 212">
-            <a:extLst>
-              <a:ext uri="{FF2B5EF4-FFF2-40B4-BE49-F238E27FC236}">
-                <a16:creationId xmlns:a16="http://schemas.microsoft.com/office/drawing/2014/main" id="{8C6774FF-C9BD-7D87-F181-2E3B755536A4}"/>
-              </a:ext>
-            </a:extLst>
-          </p:cNvPr>
-          <p:cNvSpPr/>
-          <p:nvPr/>
-        </p:nvSpPr>
-        <p:spPr>
-          <a:xfrm rot="16200000">
-            <a:off x="12380986" y="10504820"/>
-            <a:ext cx="713624" cy="1203703"/>
-          </a:xfrm>
-          <a:prstGeom prst="downArrow">
-            <a:avLst/>
-          </a:prstGeom>
-          <a:noFill/>
-          <a:ln>
-            <a:solidFill>
-              <a:srgbClr val="C00000"/>
-            </a:solidFill>
-          </a:ln>
-        </p:spPr>
-        <p:style>
-          <a:lnRef idx="2">
-            <a:schemeClr val="accent1">
-              <a:shade val="50000"/>
-            </a:schemeClr>
-          </a:lnRef>
-          <a:fillRef idx="1">
-            <a:schemeClr val="accent1"/>
-          </a:fillRef>
-          <a:effectRef idx="0">
-            <a:schemeClr val="accent1"/>
-          </a:effectRef>
-          <a:fontRef idx="minor">
-            <a:schemeClr val="lt1"/>
-          </a:fontRef>
-        </p:style>
-        <p:txBody>
-          <a:bodyPr rtlCol="0" anchor="ctr"/>
-          <a:lstStyle/>
-          <a:p>
-            <a:pPr algn="ctr"/>
-            <a:endParaRPr lang="en-US" sz="2800">
-              <a:solidFill>
-                <a:srgbClr val="FF0000"/>
-              </a:solidFill>
-            </a:endParaRPr>
-          </a:p>
-        </p:txBody>
-      </p:sp>
-      <p:sp>
-        <p:nvSpPr>
-          <p:cNvPr id="214" name="Arrow: Down 213">
-            <a:extLst>
-              <a:ext uri="{FF2B5EF4-FFF2-40B4-BE49-F238E27FC236}">
-                <a16:creationId xmlns:a16="http://schemas.microsoft.com/office/drawing/2014/main" id="{2A8180C9-3585-14D6-AD1C-2E2C5B0D6BC8}"/>
-              </a:ext>
-            </a:extLst>
-          </p:cNvPr>
-          <p:cNvSpPr/>
-          <p:nvPr/>
-        </p:nvSpPr>
-        <p:spPr>
-          <a:xfrm rot="16200000">
-            <a:off x="19166848" y="10496197"/>
-            <a:ext cx="713624" cy="1203703"/>
-          </a:xfrm>
-          <a:prstGeom prst="downArrow">
-            <a:avLst/>
-          </a:prstGeom>
-          <a:noFill/>
-          <a:ln>
-            <a:solidFill>
-              <a:srgbClr val="C00000"/>
             </a:solidFill>
           </a:ln>
         </p:spPr>
@@ -5801,12 +5696,16 @@
           <p:nvPr/>
         </p:nvSpPr>
         <p:spPr>
-          <a:xfrm>
-            <a:off x="12970250" y="5359699"/>
-            <a:ext cx="1491499" cy="3952354"/>
+          <a:xfrm rot="355007">
+            <a:off x="12629550" y="4597315"/>
+            <a:ext cx="1243324" cy="5851186"/>
           </a:xfrm>
           <a:prstGeom prst="curvedRightArrow">
-            <a:avLst/>
+            <a:avLst>
+              <a:gd name="adj1" fmla="val 25000"/>
+              <a:gd name="adj2" fmla="val 72397"/>
+              <a:gd name="adj3" fmla="val 37556"/>
+            </a:avLst>
           </a:prstGeom>
           <a:solidFill>
             <a:schemeClr val="bg1"/>
@@ -5846,12 +5745,56 @@
           </a:p>
         </p:txBody>
       </p:sp>
-      <p:sp>
-        <p:nvSpPr>
-          <p:cNvPr id="160" name="Arrow: Curved Right 159">
+      <p:cxnSp>
+        <p:nvCxnSpPr>
+          <p:cNvPr id="162" name="Straight Connector 161">
             <a:extLst>
               <a:ext uri="{FF2B5EF4-FFF2-40B4-BE49-F238E27FC236}">
-                <a16:creationId xmlns:a16="http://schemas.microsoft.com/office/drawing/2014/main" id="{F5C7449B-47A9-8431-217F-6C4F0EF84D9A}"/>
+                <a16:creationId xmlns:a16="http://schemas.microsoft.com/office/drawing/2014/main" id="{18FC2C1E-1543-759E-84B6-C3EABF1DF101}"/>
+              </a:ext>
+            </a:extLst>
+          </p:cNvPr>
+          <p:cNvCxnSpPr>
+            <a:cxnSpLocks/>
+          </p:cNvCxnSpPr>
+          <p:nvPr/>
+        </p:nvCxnSpPr>
+        <p:spPr>
+          <a:xfrm flipH="1">
+            <a:off x="5893579" y="0"/>
+            <a:ext cx="113383" cy="21215720"/>
+          </a:xfrm>
+          <a:prstGeom prst="line">
+            <a:avLst/>
+          </a:prstGeom>
+          <a:ln w="76200">
+            <a:solidFill>
+              <a:srgbClr val="C00000"/>
+            </a:solidFill>
+            <a:prstDash val="dash"/>
+          </a:ln>
+        </p:spPr>
+        <p:style>
+          <a:lnRef idx="1">
+            <a:schemeClr val="accent1"/>
+          </a:lnRef>
+          <a:fillRef idx="0">
+            <a:schemeClr val="accent1"/>
+          </a:fillRef>
+          <a:effectRef idx="0">
+            <a:schemeClr val="accent1"/>
+          </a:effectRef>
+          <a:fontRef idx="minor">
+            <a:schemeClr val="tx1"/>
+          </a:fontRef>
+        </p:style>
+      </p:cxnSp>
+      <p:sp>
+        <p:nvSpPr>
+          <p:cNvPr id="30" name="Arrow: Curved Right 29">
+            <a:extLst>
+              <a:ext uri="{FF2B5EF4-FFF2-40B4-BE49-F238E27FC236}">
+                <a16:creationId xmlns:a16="http://schemas.microsoft.com/office/drawing/2014/main" id="{E03ADBD1-AEAC-63C3-BE04-8DBC83E9891F}"/>
               </a:ext>
             </a:extLst>
           </p:cNvPr>
@@ -5859,12 +5802,16 @@
           <p:nvPr/>
         </p:nvSpPr>
         <p:spPr>
-          <a:xfrm rot="19127516">
-            <a:off x="18120437" y="5662007"/>
-            <a:ext cx="1491499" cy="3952354"/>
+          <a:xfrm rot="20050128">
+            <a:off x="18154142" y="5168735"/>
+            <a:ext cx="1243324" cy="5851186"/>
           </a:xfrm>
           <a:prstGeom prst="curvedRightArrow">
-            <a:avLst/>
+            <a:avLst>
+              <a:gd name="adj1" fmla="val 25000"/>
+              <a:gd name="adj2" fmla="val 72397"/>
+              <a:gd name="adj3" fmla="val 37556"/>
+            </a:avLst>
           </a:prstGeom>
           <a:solidFill>
             <a:schemeClr val="bg1"/>
@@ -5904,50 +5851,6 @@
           </a:p>
         </p:txBody>
       </p:sp>
-      <p:cxnSp>
-        <p:nvCxnSpPr>
-          <p:cNvPr id="162" name="Straight Connector 161">
-            <a:extLst>
-              <a:ext uri="{FF2B5EF4-FFF2-40B4-BE49-F238E27FC236}">
-                <a16:creationId xmlns:a16="http://schemas.microsoft.com/office/drawing/2014/main" id="{18FC2C1E-1543-759E-84B6-C3EABF1DF101}"/>
-              </a:ext>
-            </a:extLst>
-          </p:cNvPr>
-          <p:cNvCxnSpPr>
-            <a:cxnSpLocks/>
-          </p:cNvCxnSpPr>
-          <p:nvPr/>
-        </p:nvCxnSpPr>
-        <p:spPr>
-          <a:xfrm flipH="1">
-            <a:off x="5893579" y="0"/>
-            <a:ext cx="113383" cy="21215720"/>
-          </a:xfrm>
-          <a:prstGeom prst="line">
-            <a:avLst/>
-          </a:prstGeom>
-          <a:ln w="76200">
-            <a:solidFill>
-              <a:srgbClr val="C00000"/>
-            </a:solidFill>
-            <a:prstDash val="dash"/>
-          </a:ln>
-        </p:spPr>
-        <p:style>
-          <a:lnRef idx="1">
-            <a:schemeClr val="accent1"/>
-          </a:lnRef>
-          <a:fillRef idx="0">
-            <a:schemeClr val="accent1"/>
-          </a:fillRef>
-          <a:effectRef idx="0">
-            <a:schemeClr val="accent1"/>
-          </a:effectRef>
-          <a:fontRef idx="minor">
-            <a:schemeClr val="tx1"/>
-          </a:fontRef>
-        </p:style>
-      </p:cxnSp>
     </p:spTree>
     <p:extLst>
       <p:ext uri="{BB962C8B-B14F-4D97-AF65-F5344CB8AC3E}">

</xml_diff>